<commit_message>
completed readme, plus new image
</commit_message>
<xml_diff>
--- a/L3 Python U00 Flask.pptx
+++ b/L3 Python U00 Flask.pptx
@@ -12,7 +12,7 @@
     <p:sldId id="260" r:id="rId6"/>
     <p:sldId id="261" r:id="rId7"/>
     <p:sldId id="268" r:id="rId8"/>
-    <p:sldId id="262" r:id="rId9"/>
+    <p:sldId id="269" r:id="rId9"/>
     <p:sldId id="263" r:id="rId10"/>
     <p:sldId id="264" r:id="rId11"/>
     <p:sldId id="265" r:id="rId12"/>
@@ -872,6 +872,753 @@
 </file>
 
 <file path=ppt/diagrams/colors2.xml><?xml version="1.0" encoding="utf-8"?>
+<dgm:colorsDef xmlns:dgm="http://schemas.openxmlformats.org/drawingml/2006/diagram" xmlns:a="http://schemas.openxmlformats.org/drawingml/2006/main" uniqueId="urn:microsoft.com/office/officeart/2005/8/colors/accent1_2">
+  <dgm:title val=""/>
+  <dgm:desc val=""/>
+  <dgm:catLst>
+    <dgm:cat type="accent1" pri="11200"/>
+  </dgm:catLst>
+  <dgm:styleLbl name="node0">
+    <dgm:fillClrLst meth="repeat">
+      <a:schemeClr val="accent1"/>
+    </dgm:fillClrLst>
+    <dgm:linClrLst meth="repeat">
+      <a:schemeClr val="lt1"/>
+    </dgm:linClrLst>
+    <dgm:effectClrLst/>
+    <dgm:txLinClrLst/>
+    <dgm:txFillClrLst/>
+    <dgm:txEffectClrLst/>
+  </dgm:styleLbl>
+  <dgm:styleLbl name="alignNode1">
+    <dgm:fillClrLst meth="repeat">
+      <a:schemeClr val="accent1"/>
+    </dgm:fillClrLst>
+    <dgm:linClrLst meth="repeat">
+      <a:schemeClr val="accent1"/>
+    </dgm:linClrLst>
+    <dgm:effectClrLst/>
+    <dgm:txLinClrLst/>
+    <dgm:txFillClrLst/>
+    <dgm:txEffectClrLst/>
+  </dgm:styleLbl>
+  <dgm:styleLbl name="node1">
+    <dgm:fillClrLst meth="repeat">
+      <a:schemeClr val="accent1"/>
+    </dgm:fillClrLst>
+    <dgm:linClrLst meth="repeat">
+      <a:schemeClr val="lt1"/>
+    </dgm:linClrLst>
+    <dgm:effectClrLst/>
+    <dgm:txLinClrLst/>
+    <dgm:txFillClrLst/>
+    <dgm:txEffectClrLst/>
+  </dgm:styleLbl>
+  <dgm:styleLbl name="lnNode1">
+    <dgm:fillClrLst meth="repeat">
+      <a:schemeClr val="accent1"/>
+    </dgm:fillClrLst>
+    <dgm:linClrLst meth="repeat">
+      <a:schemeClr val="lt1"/>
+    </dgm:linClrLst>
+    <dgm:effectClrLst/>
+    <dgm:txLinClrLst/>
+    <dgm:txFillClrLst/>
+    <dgm:txEffectClrLst/>
+  </dgm:styleLbl>
+  <dgm:styleLbl name="vennNode1">
+    <dgm:fillClrLst meth="repeat">
+      <a:schemeClr val="accent1">
+        <a:alpha val="50000"/>
+      </a:schemeClr>
+    </dgm:fillClrLst>
+    <dgm:linClrLst meth="repeat">
+      <a:schemeClr val="lt1"/>
+    </dgm:linClrLst>
+    <dgm:effectClrLst/>
+    <dgm:txLinClrLst/>
+    <dgm:txFillClrLst/>
+    <dgm:txEffectClrLst/>
+  </dgm:styleLbl>
+  <dgm:styleLbl name="node2">
+    <dgm:fillClrLst meth="repeat">
+      <a:schemeClr val="accent1"/>
+    </dgm:fillClrLst>
+    <dgm:linClrLst meth="repeat">
+      <a:schemeClr val="lt1"/>
+    </dgm:linClrLst>
+    <dgm:effectClrLst/>
+    <dgm:txLinClrLst/>
+    <dgm:txFillClrLst/>
+    <dgm:txEffectClrLst/>
+  </dgm:styleLbl>
+  <dgm:styleLbl name="node3">
+    <dgm:fillClrLst meth="repeat">
+      <a:schemeClr val="accent1"/>
+    </dgm:fillClrLst>
+    <dgm:linClrLst meth="repeat">
+      <a:schemeClr val="lt1"/>
+    </dgm:linClrLst>
+    <dgm:effectClrLst/>
+    <dgm:txLinClrLst/>
+    <dgm:txFillClrLst/>
+    <dgm:txEffectClrLst/>
+  </dgm:styleLbl>
+  <dgm:styleLbl name="node4">
+    <dgm:fillClrLst meth="repeat">
+      <a:schemeClr val="accent1"/>
+    </dgm:fillClrLst>
+    <dgm:linClrLst meth="repeat">
+      <a:schemeClr val="lt1"/>
+    </dgm:linClrLst>
+    <dgm:effectClrLst/>
+    <dgm:txLinClrLst/>
+    <dgm:txFillClrLst/>
+    <dgm:txEffectClrLst/>
+  </dgm:styleLbl>
+  <dgm:styleLbl name="fgImgPlace1">
+    <dgm:fillClrLst meth="repeat">
+      <a:schemeClr val="accent1">
+        <a:tint val="50000"/>
+      </a:schemeClr>
+    </dgm:fillClrLst>
+    <dgm:linClrLst meth="repeat">
+      <a:schemeClr val="lt1"/>
+    </dgm:linClrLst>
+    <dgm:effectClrLst/>
+    <dgm:txLinClrLst/>
+    <dgm:txFillClrLst meth="repeat">
+      <a:schemeClr val="lt1"/>
+    </dgm:txFillClrLst>
+    <dgm:txEffectClrLst/>
+  </dgm:styleLbl>
+  <dgm:styleLbl name="alignImgPlace1">
+    <dgm:fillClrLst meth="repeat">
+      <a:schemeClr val="accent1">
+        <a:tint val="50000"/>
+      </a:schemeClr>
+    </dgm:fillClrLst>
+    <dgm:linClrLst meth="repeat">
+      <a:schemeClr val="lt1"/>
+    </dgm:linClrLst>
+    <dgm:effectClrLst/>
+    <dgm:txLinClrLst/>
+    <dgm:txFillClrLst meth="repeat">
+      <a:schemeClr val="lt1"/>
+    </dgm:txFillClrLst>
+    <dgm:txEffectClrLst/>
+  </dgm:styleLbl>
+  <dgm:styleLbl name="bgImgPlace1">
+    <dgm:fillClrLst meth="repeat">
+      <a:schemeClr val="accent1">
+        <a:tint val="50000"/>
+      </a:schemeClr>
+    </dgm:fillClrLst>
+    <dgm:linClrLst meth="repeat">
+      <a:schemeClr val="lt1"/>
+    </dgm:linClrLst>
+    <dgm:effectClrLst/>
+    <dgm:txLinClrLst/>
+    <dgm:txFillClrLst meth="repeat">
+      <a:schemeClr val="lt1"/>
+    </dgm:txFillClrLst>
+    <dgm:txEffectClrLst/>
+  </dgm:styleLbl>
+  <dgm:styleLbl name="sibTrans2D1">
+    <dgm:fillClrLst meth="repeat">
+      <a:schemeClr val="accent1">
+        <a:tint val="60000"/>
+      </a:schemeClr>
+    </dgm:fillClrLst>
+    <dgm:linClrLst meth="repeat">
+      <a:schemeClr val="accent1">
+        <a:tint val="60000"/>
+      </a:schemeClr>
+    </dgm:linClrLst>
+    <dgm:effectClrLst/>
+    <dgm:txLinClrLst/>
+    <dgm:txFillClrLst/>
+    <dgm:txEffectClrLst/>
+  </dgm:styleLbl>
+  <dgm:styleLbl name="fgSibTrans2D1">
+    <dgm:fillClrLst meth="repeat">
+      <a:schemeClr val="accent1">
+        <a:tint val="60000"/>
+      </a:schemeClr>
+    </dgm:fillClrLst>
+    <dgm:linClrLst meth="repeat">
+      <a:schemeClr val="accent1">
+        <a:tint val="60000"/>
+      </a:schemeClr>
+    </dgm:linClrLst>
+    <dgm:effectClrLst/>
+    <dgm:txLinClrLst/>
+    <dgm:txFillClrLst/>
+    <dgm:txEffectClrLst/>
+  </dgm:styleLbl>
+  <dgm:styleLbl name="bgSibTrans2D1">
+    <dgm:fillClrLst meth="repeat">
+      <a:schemeClr val="accent1">
+        <a:tint val="60000"/>
+      </a:schemeClr>
+    </dgm:fillClrLst>
+    <dgm:linClrLst meth="repeat">
+      <a:schemeClr val="accent1">
+        <a:tint val="60000"/>
+      </a:schemeClr>
+    </dgm:linClrLst>
+    <dgm:effectClrLst/>
+    <dgm:txLinClrLst/>
+    <dgm:txFillClrLst/>
+    <dgm:txEffectClrLst/>
+  </dgm:styleLbl>
+  <dgm:styleLbl name="sibTrans1D1">
+    <dgm:fillClrLst meth="repeat">
+      <a:schemeClr val="accent1"/>
+    </dgm:fillClrLst>
+    <dgm:linClrLst meth="repeat">
+      <a:schemeClr val="accent1"/>
+    </dgm:linClrLst>
+    <dgm:effectClrLst/>
+    <dgm:txLinClrLst/>
+    <dgm:txFillClrLst meth="repeat">
+      <a:schemeClr val="tx1"/>
+    </dgm:txFillClrLst>
+    <dgm:txEffectClrLst/>
+  </dgm:styleLbl>
+  <dgm:styleLbl name="callout">
+    <dgm:fillClrLst meth="repeat">
+      <a:schemeClr val="accent1"/>
+    </dgm:fillClrLst>
+    <dgm:linClrLst meth="repeat">
+      <a:schemeClr val="accent1">
+        <a:tint val="50000"/>
+      </a:schemeClr>
+    </dgm:linClrLst>
+    <dgm:effectClrLst/>
+    <dgm:txLinClrLst/>
+    <dgm:txFillClrLst meth="repeat">
+      <a:schemeClr val="tx1"/>
+    </dgm:txFillClrLst>
+    <dgm:txEffectClrLst/>
+  </dgm:styleLbl>
+  <dgm:styleLbl name="asst0">
+    <dgm:fillClrLst meth="repeat">
+      <a:schemeClr val="accent1"/>
+    </dgm:fillClrLst>
+    <dgm:linClrLst meth="repeat">
+      <a:schemeClr val="lt1"/>
+    </dgm:linClrLst>
+    <dgm:effectClrLst/>
+    <dgm:txLinClrLst/>
+    <dgm:txFillClrLst/>
+    <dgm:txEffectClrLst/>
+  </dgm:styleLbl>
+  <dgm:styleLbl name="asst1">
+    <dgm:fillClrLst meth="repeat">
+      <a:schemeClr val="accent1"/>
+    </dgm:fillClrLst>
+    <dgm:linClrLst meth="repeat">
+      <a:schemeClr val="lt1"/>
+    </dgm:linClrLst>
+    <dgm:effectClrLst/>
+    <dgm:txLinClrLst/>
+    <dgm:txFillClrLst/>
+    <dgm:txEffectClrLst/>
+  </dgm:styleLbl>
+  <dgm:styleLbl name="asst2">
+    <dgm:fillClrLst meth="repeat">
+      <a:schemeClr val="accent1"/>
+    </dgm:fillClrLst>
+    <dgm:linClrLst meth="repeat">
+      <a:schemeClr val="lt1"/>
+    </dgm:linClrLst>
+    <dgm:effectClrLst/>
+    <dgm:txLinClrLst/>
+    <dgm:txFillClrLst/>
+    <dgm:txEffectClrLst/>
+  </dgm:styleLbl>
+  <dgm:styleLbl name="asst3">
+    <dgm:fillClrLst meth="repeat">
+      <a:schemeClr val="accent1"/>
+    </dgm:fillClrLst>
+    <dgm:linClrLst meth="repeat">
+      <a:schemeClr val="lt1"/>
+    </dgm:linClrLst>
+    <dgm:effectClrLst/>
+    <dgm:txLinClrLst/>
+    <dgm:txFillClrLst/>
+    <dgm:txEffectClrLst/>
+  </dgm:styleLbl>
+  <dgm:styleLbl name="asst4">
+    <dgm:fillClrLst meth="repeat">
+      <a:schemeClr val="accent1"/>
+    </dgm:fillClrLst>
+    <dgm:linClrLst meth="repeat">
+      <a:schemeClr val="lt1"/>
+    </dgm:linClrLst>
+    <dgm:effectClrLst/>
+    <dgm:txLinClrLst/>
+    <dgm:txFillClrLst/>
+    <dgm:txEffectClrLst/>
+  </dgm:styleLbl>
+  <dgm:styleLbl name="parChTrans2D1">
+    <dgm:fillClrLst meth="repeat">
+      <a:schemeClr val="accent1">
+        <a:tint val="60000"/>
+      </a:schemeClr>
+    </dgm:fillClrLst>
+    <dgm:linClrLst meth="repeat">
+      <a:schemeClr val="accent1">
+        <a:tint val="60000"/>
+      </a:schemeClr>
+    </dgm:linClrLst>
+    <dgm:effectClrLst/>
+    <dgm:txLinClrLst/>
+    <dgm:txFillClrLst meth="repeat">
+      <a:schemeClr val="lt1"/>
+    </dgm:txFillClrLst>
+    <dgm:txEffectClrLst/>
+  </dgm:styleLbl>
+  <dgm:styleLbl name="parChTrans2D2">
+    <dgm:fillClrLst meth="repeat">
+      <a:schemeClr val="accent1"/>
+    </dgm:fillClrLst>
+    <dgm:linClrLst meth="repeat">
+      <a:schemeClr val="accent1"/>
+    </dgm:linClrLst>
+    <dgm:effectClrLst/>
+    <dgm:txLinClrLst/>
+    <dgm:txFillClrLst meth="repeat">
+      <a:schemeClr val="lt1"/>
+    </dgm:txFillClrLst>
+    <dgm:txEffectClrLst/>
+  </dgm:styleLbl>
+  <dgm:styleLbl name="parChTrans2D3">
+    <dgm:fillClrLst meth="repeat">
+      <a:schemeClr val="accent1"/>
+    </dgm:fillClrLst>
+    <dgm:linClrLst meth="repeat">
+      <a:schemeClr val="accent1"/>
+    </dgm:linClrLst>
+    <dgm:effectClrLst/>
+    <dgm:txLinClrLst/>
+    <dgm:txFillClrLst meth="repeat">
+      <a:schemeClr val="lt1"/>
+    </dgm:txFillClrLst>
+    <dgm:txEffectClrLst/>
+  </dgm:styleLbl>
+  <dgm:styleLbl name="parChTrans2D4">
+    <dgm:fillClrLst meth="repeat">
+      <a:schemeClr val="accent1"/>
+    </dgm:fillClrLst>
+    <dgm:linClrLst meth="repeat">
+      <a:schemeClr val="accent1"/>
+    </dgm:linClrLst>
+    <dgm:effectClrLst/>
+    <dgm:txLinClrLst/>
+    <dgm:txFillClrLst meth="repeat">
+      <a:schemeClr val="lt1"/>
+    </dgm:txFillClrLst>
+    <dgm:txEffectClrLst/>
+  </dgm:styleLbl>
+  <dgm:styleLbl name="parChTrans1D1">
+    <dgm:fillClrLst meth="repeat">
+      <a:schemeClr val="accent1"/>
+    </dgm:fillClrLst>
+    <dgm:linClrLst meth="repeat">
+      <a:schemeClr val="accent1">
+        <a:shade val="60000"/>
+      </a:schemeClr>
+    </dgm:linClrLst>
+    <dgm:effectClrLst/>
+    <dgm:txLinClrLst/>
+    <dgm:txFillClrLst meth="repeat">
+      <a:schemeClr val="tx1"/>
+    </dgm:txFillClrLst>
+    <dgm:txEffectClrLst/>
+  </dgm:styleLbl>
+  <dgm:styleLbl name="parChTrans1D2">
+    <dgm:fillClrLst meth="repeat">
+      <a:schemeClr val="accent1"/>
+    </dgm:fillClrLst>
+    <dgm:linClrLst meth="repeat">
+      <a:schemeClr val="accent1">
+        <a:shade val="60000"/>
+      </a:schemeClr>
+    </dgm:linClrLst>
+    <dgm:effectClrLst/>
+    <dgm:txLinClrLst/>
+    <dgm:txFillClrLst meth="repeat">
+      <a:schemeClr val="tx1"/>
+    </dgm:txFillClrLst>
+    <dgm:txEffectClrLst/>
+  </dgm:styleLbl>
+  <dgm:styleLbl name="parChTrans1D3">
+    <dgm:fillClrLst meth="repeat">
+      <a:schemeClr val="accent1"/>
+    </dgm:fillClrLst>
+    <dgm:linClrLst meth="repeat">
+      <a:schemeClr val="accent1">
+        <a:shade val="80000"/>
+      </a:schemeClr>
+    </dgm:linClrLst>
+    <dgm:effectClrLst/>
+    <dgm:txLinClrLst/>
+    <dgm:txFillClrLst meth="repeat">
+      <a:schemeClr val="tx1"/>
+    </dgm:txFillClrLst>
+    <dgm:txEffectClrLst/>
+  </dgm:styleLbl>
+  <dgm:styleLbl name="parChTrans1D4">
+    <dgm:fillClrLst meth="repeat">
+      <a:schemeClr val="accent1"/>
+    </dgm:fillClrLst>
+    <dgm:linClrLst meth="repeat">
+      <a:schemeClr val="accent1">
+        <a:shade val="80000"/>
+      </a:schemeClr>
+    </dgm:linClrLst>
+    <dgm:effectClrLst/>
+    <dgm:txLinClrLst/>
+    <dgm:txFillClrLst meth="repeat">
+      <a:schemeClr val="tx1"/>
+    </dgm:txFillClrLst>
+    <dgm:txEffectClrLst/>
+  </dgm:styleLbl>
+  <dgm:styleLbl name="fgAcc1">
+    <dgm:fillClrLst meth="repeat">
+      <a:schemeClr val="lt1">
+        <a:alpha val="90000"/>
+      </a:schemeClr>
+    </dgm:fillClrLst>
+    <dgm:linClrLst meth="repeat">
+      <a:schemeClr val="accent1"/>
+    </dgm:linClrLst>
+    <dgm:effectClrLst/>
+    <dgm:txLinClrLst/>
+    <dgm:txFillClrLst meth="repeat">
+      <a:schemeClr val="dk1"/>
+    </dgm:txFillClrLst>
+    <dgm:txEffectClrLst/>
+  </dgm:styleLbl>
+  <dgm:styleLbl name="conFgAcc1">
+    <dgm:fillClrLst meth="repeat">
+      <a:schemeClr val="lt1">
+        <a:alpha val="90000"/>
+      </a:schemeClr>
+    </dgm:fillClrLst>
+    <dgm:linClrLst meth="repeat">
+      <a:schemeClr val="accent1"/>
+    </dgm:linClrLst>
+    <dgm:effectClrLst/>
+    <dgm:txLinClrLst/>
+    <dgm:txFillClrLst meth="repeat">
+      <a:schemeClr val="dk1"/>
+    </dgm:txFillClrLst>
+    <dgm:txEffectClrLst/>
+  </dgm:styleLbl>
+  <dgm:styleLbl name="alignAcc1">
+    <dgm:fillClrLst meth="repeat">
+      <a:schemeClr val="lt1">
+        <a:alpha val="90000"/>
+      </a:schemeClr>
+    </dgm:fillClrLst>
+    <dgm:linClrLst meth="repeat">
+      <a:schemeClr val="accent1"/>
+    </dgm:linClrLst>
+    <dgm:effectClrLst/>
+    <dgm:txLinClrLst/>
+    <dgm:txFillClrLst meth="repeat">
+      <a:schemeClr val="dk1"/>
+    </dgm:txFillClrLst>
+    <dgm:txEffectClrLst/>
+  </dgm:styleLbl>
+  <dgm:styleLbl name="trAlignAcc1">
+    <dgm:fillClrLst meth="repeat">
+      <a:schemeClr val="lt1">
+        <a:alpha val="40000"/>
+      </a:schemeClr>
+    </dgm:fillClrLst>
+    <dgm:linClrLst meth="repeat">
+      <a:schemeClr val="accent1"/>
+    </dgm:linClrLst>
+    <dgm:effectClrLst/>
+    <dgm:txLinClrLst/>
+    <dgm:txFillClrLst meth="repeat">
+      <a:schemeClr val="dk1"/>
+    </dgm:txFillClrLst>
+    <dgm:txEffectClrLst/>
+  </dgm:styleLbl>
+  <dgm:styleLbl name="bgAcc1">
+    <dgm:fillClrLst meth="repeat">
+      <a:schemeClr val="lt1">
+        <a:alpha val="90000"/>
+      </a:schemeClr>
+    </dgm:fillClrLst>
+    <dgm:linClrLst meth="repeat">
+      <a:schemeClr val="accent1"/>
+    </dgm:linClrLst>
+    <dgm:effectClrLst/>
+    <dgm:txLinClrLst/>
+    <dgm:txFillClrLst meth="repeat">
+      <a:schemeClr val="dk1"/>
+    </dgm:txFillClrLst>
+    <dgm:txEffectClrLst/>
+  </dgm:styleLbl>
+  <dgm:styleLbl name="solidFgAcc1">
+    <dgm:fillClrLst meth="repeat">
+      <a:schemeClr val="lt1"/>
+    </dgm:fillClrLst>
+    <dgm:linClrLst meth="repeat">
+      <a:schemeClr val="accent1"/>
+    </dgm:linClrLst>
+    <dgm:effectClrLst/>
+    <dgm:txLinClrLst/>
+    <dgm:txFillClrLst meth="repeat">
+      <a:schemeClr val="dk1"/>
+    </dgm:txFillClrLst>
+    <dgm:txEffectClrLst/>
+  </dgm:styleLbl>
+  <dgm:styleLbl name="solidAlignAcc1">
+    <dgm:fillClrLst meth="repeat">
+      <a:schemeClr val="lt1"/>
+    </dgm:fillClrLst>
+    <dgm:linClrLst meth="repeat">
+      <a:schemeClr val="accent1"/>
+    </dgm:linClrLst>
+    <dgm:effectClrLst/>
+    <dgm:txLinClrLst/>
+    <dgm:txFillClrLst meth="repeat">
+      <a:schemeClr val="dk1"/>
+    </dgm:txFillClrLst>
+    <dgm:txEffectClrLst/>
+  </dgm:styleLbl>
+  <dgm:styleLbl name="solidBgAcc1">
+    <dgm:fillClrLst meth="repeat">
+      <a:schemeClr val="lt1"/>
+    </dgm:fillClrLst>
+    <dgm:linClrLst meth="repeat">
+      <a:schemeClr val="accent1"/>
+    </dgm:linClrLst>
+    <dgm:effectClrLst/>
+    <dgm:txLinClrLst/>
+    <dgm:txFillClrLst meth="repeat">
+      <a:schemeClr val="dk1"/>
+    </dgm:txFillClrLst>
+    <dgm:txEffectClrLst/>
+  </dgm:styleLbl>
+  <dgm:styleLbl name="fgAccFollowNode1">
+    <dgm:fillClrLst meth="repeat">
+      <a:schemeClr val="accent1">
+        <a:alpha val="90000"/>
+        <a:tint val="40000"/>
+      </a:schemeClr>
+    </dgm:fillClrLst>
+    <dgm:linClrLst meth="repeat">
+      <a:schemeClr val="accent1">
+        <a:alpha val="90000"/>
+        <a:tint val="40000"/>
+      </a:schemeClr>
+    </dgm:linClrLst>
+    <dgm:effectClrLst/>
+    <dgm:txLinClrLst/>
+    <dgm:txFillClrLst meth="repeat">
+      <a:schemeClr val="dk1"/>
+    </dgm:txFillClrLst>
+    <dgm:txEffectClrLst/>
+  </dgm:styleLbl>
+  <dgm:styleLbl name="alignAccFollowNode1">
+    <dgm:fillClrLst meth="repeat">
+      <a:schemeClr val="accent1">
+        <a:alpha val="90000"/>
+        <a:tint val="40000"/>
+      </a:schemeClr>
+    </dgm:fillClrLst>
+    <dgm:linClrLst meth="repeat">
+      <a:schemeClr val="accent1">
+        <a:alpha val="90000"/>
+        <a:tint val="40000"/>
+      </a:schemeClr>
+    </dgm:linClrLst>
+    <dgm:effectClrLst/>
+    <dgm:txLinClrLst/>
+    <dgm:txFillClrLst meth="repeat">
+      <a:schemeClr val="dk1"/>
+    </dgm:txFillClrLst>
+    <dgm:txEffectClrLst/>
+  </dgm:styleLbl>
+  <dgm:styleLbl name="bgAccFollowNode1">
+    <dgm:fillClrLst meth="repeat">
+      <a:schemeClr val="accent1">
+        <a:alpha val="90000"/>
+        <a:tint val="40000"/>
+      </a:schemeClr>
+    </dgm:fillClrLst>
+    <dgm:linClrLst meth="repeat">
+      <a:schemeClr val="accent1">
+        <a:alpha val="90000"/>
+        <a:tint val="40000"/>
+      </a:schemeClr>
+    </dgm:linClrLst>
+    <dgm:effectClrLst/>
+    <dgm:txLinClrLst/>
+    <dgm:txFillClrLst meth="repeat">
+      <a:schemeClr val="dk1"/>
+    </dgm:txFillClrLst>
+    <dgm:txEffectClrLst/>
+  </dgm:styleLbl>
+  <dgm:styleLbl name="fgAcc0">
+    <dgm:fillClrLst meth="repeat">
+      <a:schemeClr val="lt1">
+        <a:alpha val="90000"/>
+      </a:schemeClr>
+    </dgm:fillClrLst>
+    <dgm:linClrLst meth="repeat">
+      <a:schemeClr val="accent1"/>
+    </dgm:linClrLst>
+    <dgm:effectClrLst/>
+    <dgm:txLinClrLst/>
+    <dgm:txFillClrLst meth="repeat">
+      <a:schemeClr val="dk1"/>
+    </dgm:txFillClrLst>
+    <dgm:txEffectClrLst/>
+  </dgm:styleLbl>
+  <dgm:styleLbl name="fgAcc2">
+    <dgm:fillClrLst meth="repeat">
+      <a:schemeClr val="lt1">
+        <a:alpha val="90000"/>
+      </a:schemeClr>
+    </dgm:fillClrLst>
+    <dgm:linClrLst meth="repeat">
+      <a:schemeClr val="accent1"/>
+    </dgm:linClrLst>
+    <dgm:effectClrLst/>
+    <dgm:txLinClrLst/>
+    <dgm:txFillClrLst meth="repeat">
+      <a:schemeClr val="dk1"/>
+    </dgm:txFillClrLst>
+    <dgm:txEffectClrLst/>
+  </dgm:styleLbl>
+  <dgm:styleLbl name="fgAcc3">
+    <dgm:fillClrLst meth="repeat">
+      <a:schemeClr val="lt1">
+        <a:alpha val="90000"/>
+      </a:schemeClr>
+    </dgm:fillClrLst>
+    <dgm:linClrLst meth="repeat">
+      <a:schemeClr val="accent1"/>
+    </dgm:linClrLst>
+    <dgm:effectClrLst/>
+    <dgm:txLinClrLst/>
+    <dgm:txFillClrLst meth="repeat">
+      <a:schemeClr val="dk1"/>
+    </dgm:txFillClrLst>
+    <dgm:txEffectClrLst/>
+  </dgm:styleLbl>
+  <dgm:styleLbl name="fgAcc4">
+    <dgm:fillClrLst meth="repeat">
+      <a:schemeClr val="lt1">
+        <a:alpha val="90000"/>
+      </a:schemeClr>
+    </dgm:fillClrLst>
+    <dgm:linClrLst meth="repeat">
+      <a:schemeClr val="accent1"/>
+    </dgm:linClrLst>
+    <dgm:effectClrLst/>
+    <dgm:txLinClrLst/>
+    <dgm:txFillClrLst meth="repeat">
+      <a:schemeClr val="dk1"/>
+    </dgm:txFillClrLst>
+    <dgm:txEffectClrLst/>
+  </dgm:styleLbl>
+  <dgm:styleLbl name="bgShp">
+    <dgm:fillClrLst meth="repeat">
+      <a:schemeClr val="accent1">
+        <a:tint val="40000"/>
+      </a:schemeClr>
+    </dgm:fillClrLst>
+    <dgm:linClrLst meth="repeat">
+      <a:schemeClr val="accent1"/>
+    </dgm:linClrLst>
+    <dgm:effectClrLst/>
+    <dgm:txLinClrLst/>
+    <dgm:txFillClrLst meth="repeat">
+      <a:schemeClr val="dk1"/>
+    </dgm:txFillClrLst>
+    <dgm:txEffectClrLst/>
+  </dgm:styleLbl>
+  <dgm:styleLbl name="dkBgShp">
+    <dgm:fillClrLst meth="repeat">
+      <a:schemeClr val="accent1">
+        <a:shade val="80000"/>
+      </a:schemeClr>
+    </dgm:fillClrLst>
+    <dgm:linClrLst meth="repeat">
+      <a:schemeClr val="accent1"/>
+    </dgm:linClrLst>
+    <dgm:effectClrLst/>
+    <dgm:txLinClrLst/>
+    <dgm:txFillClrLst meth="repeat">
+      <a:schemeClr val="lt1"/>
+    </dgm:txFillClrLst>
+    <dgm:txEffectClrLst/>
+  </dgm:styleLbl>
+  <dgm:styleLbl name="trBgShp">
+    <dgm:fillClrLst meth="repeat">
+      <a:schemeClr val="accent1">
+        <a:tint val="50000"/>
+        <a:alpha val="40000"/>
+      </a:schemeClr>
+    </dgm:fillClrLst>
+    <dgm:linClrLst meth="repeat">
+      <a:schemeClr val="accent1"/>
+    </dgm:linClrLst>
+    <dgm:effectClrLst/>
+    <dgm:txLinClrLst/>
+    <dgm:txFillClrLst meth="repeat">
+      <a:schemeClr val="lt1"/>
+    </dgm:txFillClrLst>
+    <dgm:txEffectClrLst/>
+  </dgm:styleLbl>
+  <dgm:styleLbl name="fgShp">
+    <dgm:fillClrLst meth="repeat">
+      <a:schemeClr val="accent1">
+        <a:tint val="60000"/>
+      </a:schemeClr>
+    </dgm:fillClrLst>
+    <dgm:linClrLst meth="repeat">
+      <a:schemeClr val="lt1"/>
+    </dgm:linClrLst>
+    <dgm:effectClrLst/>
+    <dgm:txLinClrLst/>
+    <dgm:txFillClrLst meth="repeat">
+      <a:schemeClr val="dk1"/>
+    </dgm:txFillClrLst>
+    <dgm:txEffectClrLst/>
+  </dgm:styleLbl>
+  <dgm:styleLbl name="revTx">
+    <dgm:fillClrLst meth="repeat">
+      <a:schemeClr val="lt1">
+        <a:alpha val="0"/>
+      </a:schemeClr>
+    </dgm:fillClrLst>
+    <dgm:linClrLst meth="repeat">
+      <a:schemeClr val="dk1">
+        <a:alpha val="0"/>
+      </a:schemeClr>
+    </dgm:linClrLst>
+    <dgm:effectClrLst/>
+    <dgm:txLinClrLst/>
+    <dgm:txFillClrLst meth="repeat">
+      <a:schemeClr val="tx1"/>
+    </dgm:txFillClrLst>
+    <dgm:txEffectClrLst/>
+  </dgm:styleLbl>
+</dgm:colorsDef>
+</file>
+
+<file path=ppt/diagrams/colors3.xml><?xml version="1.0" encoding="utf-8"?>
 <dgm:colorsDef xmlns:dgm="http://schemas.openxmlformats.org/drawingml/2006/diagram" xmlns:a="http://schemas.openxmlformats.org/drawingml/2006/main" uniqueId="urn:microsoft.com/office/officeart/2005/8/colors/accent1_2">
   <dgm:title val=""/>
   <dgm:desc val=""/>
@@ -2263,6 +3010,346 @@
     <dgm:cxn modelId="{3783A2C6-C016-4252-9C10-B3D7C95CCD43}" srcId="{48E4E113-BF2E-44BA-9852-10B0B9620E1B}" destId="{89F8B676-3FAD-4958-9C79-E52D85464493}" srcOrd="2" destOrd="0" parTransId="{E96A745A-5785-4D0D-BE32-F9256DB862A8}" sibTransId="{75D366A8-C049-44D2-9065-24DF6FE75BEB}"/>
     <dgm:cxn modelId="{43232FD7-F966-418C-85A4-10D584F2EC76}" type="presOf" srcId="{EC65D9D0-5265-47E3-B1AF-A058EFB859D2}" destId="{34D8098B-E7BB-4D71-B992-218315005147}" srcOrd="0" destOrd="1" presId="urn:microsoft.com/office/officeart/2005/8/layout/hList1"/>
     <dgm:cxn modelId="{CE4C28EF-8A09-418C-BDC6-5F97192E1041}" srcId="{36A0B9BE-4CA2-402A-A81D-5D24B07F8E29}" destId="{EEE43A42-AB85-4E24-BDAD-4F33D0250AD3}" srcOrd="2" destOrd="0" parTransId="{C64C4997-87A4-4C5F-A552-1365E8B72982}" sibTransId="{6899F08D-84D0-4EF6-8B91-F2923FE83D34}"/>
+    <dgm:cxn modelId="{F62FBBF8-4D66-4146-B63E-F4AB99858622}" srcId="{36A0B9BE-4CA2-402A-A81D-5D24B07F8E29}" destId="{D9DF4FDC-A93B-498B-858B-0B54656E5B57}" srcOrd="0" destOrd="0" parTransId="{01F3B99E-2DEE-46D5-A810-C544D6E6A6BD}" sibTransId="{C5E9E10C-48D2-4E9C-843F-AC0E8A441C3D}"/>
+    <dgm:cxn modelId="{8700DEE9-9A8E-48F7-8AFD-6A0A46A87773}" type="presParOf" srcId="{99A747C7-7622-4FF3-B9BF-8573D665A36A}" destId="{04C0E908-5AA5-4729-964E-49A87A8C7FE6}" srcOrd="0" destOrd="0" presId="urn:microsoft.com/office/officeart/2005/8/layout/hList1"/>
+    <dgm:cxn modelId="{B2EDAB54-7CCE-4826-9542-BD3164605AFD}" type="presParOf" srcId="{04C0E908-5AA5-4729-964E-49A87A8C7FE6}" destId="{F6D0B44E-A67F-4AA3-ADD5-732D5DE8AB22}" srcOrd="0" destOrd="0" presId="urn:microsoft.com/office/officeart/2005/8/layout/hList1"/>
+    <dgm:cxn modelId="{0489CB62-FF6D-44D3-B216-075730095620}" type="presParOf" srcId="{04C0E908-5AA5-4729-964E-49A87A8C7FE6}" destId="{34D8098B-E7BB-4D71-B992-218315005147}" srcOrd="1" destOrd="0" presId="urn:microsoft.com/office/officeart/2005/8/layout/hList1"/>
+    <dgm:cxn modelId="{1971911A-2FB7-4AA1-8776-AABFD1CAC960}" type="presParOf" srcId="{99A747C7-7622-4FF3-B9BF-8573D665A36A}" destId="{A0688140-F58F-4215-89F7-DB104E3027A2}" srcOrd="1" destOrd="0" presId="urn:microsoft.com/office/officeart/2005/8/layout/hList1"/>
+    <dgm:cxn modelId="{49DABD42-01DC-4666-97B9-34C45F9EEFF5}" type="presParOf" srcId="{99A747C7-7622-4FF3-B9BF-8573D665A36A}" destId="{A75E9B72-C19E-4B08-A51A-7AF835A30CA5}" srcOrd="2" destOrd="0" presId="urn:microsoft.com/office/officeart/2005/8/layout/hList1"/>
+    <dgm:cxn modelId="{1AB253E8-C247-4735-A288-2E5AF284460D}" type="presParOf" srcId="{A75E9B72-C19E-4B08-A51A-7AF835A30CA5}" destId="{63467DEE-4DBB-40E9-9C79-7902EDEA9617}" srcOrd="0" destOrd="0" presId="urn:microsoft.com/office/officeart/2005/8/layout/hList1"/>
+    <dgm:cxn modelId="{2445F2E5-8ED9-44A5-8FAE-B742E7011A1A}" type="presParOf" srcId="{A75E9B72-C19E-4B08-A51A-7AF835A30CA5}" destId="{6723CEA6-F7D9-4136-8376-6BBF528D685B}" srcOrd="1" destOrd="0" presId="urn:microsoft.com/office/officeart/2005/8/layout/hList1"/>
+    <dgm:cxn modelId="{D8D1CA8F-BEAC-4546-8183-F0B9024B3481}" type="presParOf" srcId="{99A747C7-7622-4FF3-B9BF-8573D665A36A}" destId="{7E007A80-C2DD-4ABD-A0F2-86BC98953C8C}" srcOrd="3" destOrd="0" presId="urn:microsoft.com/office/officeart/2005/8/layout/hList1"/>
+    <dgm:cxn modelId="{C9ED906E-5B2B-4DCB-98AA-4820DE5A3CF3}" type="presParOf" srcId="{99A747C7-7622-4FF3-B9BF-8573D665A36A}" destId="{78722815-074B-47EA-A8DF-3C29EC3C48A4}" srcOrd="4" destOrd="0" presId="urn:microsoft.com/office/officeart/2005/8/layout/hList1"/>
+    <dgm:cxn modelId="{A00ADE26-095C-4DBC-95BA-01234E966D8C}" type="presParOf" srcId="{78722815-074B-47EA-A8DF-3C29EC3C48A4}" destId="{821120DC-C865-40BE-B9ED-E47BE014AE8C}" srcOrd="0" destOrd="0" presId="urn:microsoft.com/office/officeart/2005/8/layout/hList1"/>
+    <dgm:cxn modelId="{3DD4FD1B-895A-449A-BF96-81B2955DE315}" type="presParOf" srcId="{78722815-074B-47EA-A8DF-3C29EC3C48A4}" destId="{5365651C-1395-42B1-B455-75CC18FDB480}" srcOrd="1" destOrd="0" presId="urn:microsoft.com/office/officeart/2005/8/layout/hList1"/>
+    <dgm:cxn modelId="{338192B6-472A-4D32-8111-7975C65DE1BE}" type="presParOf" srcId="{99A747C7-7622-4FF3-B9BF-8573D665A36A}" destId="{31A61769-84BE-4E7C-AEC5-C8F8AC95E429}" srcOrd="5" destOrd="0" presId="urn:microsoft.com/office/officeart/2005/8/layout/hList1"/>
+    <dgm:cxn modelId="{4D188EFA-9644-42DD-BBCA-12757B2D1AF1}" type="presParOf" srcId="{99A747C7-7622-4FF3-B9BF-8573D665A36A}" destId="{31F2AFA3-4E82-425F-9C75-AAED6D4C8B03}" srcOrd="6" destOrd="0" presId="urn:microsoft.com/office/officeart/2005/8/layout/hList1"/>
+    <dgm:cxn modelId="{256FE572-114F-4F0E-90D1-7DABC50E0CA1}" type="presParOf" srcId="{31F2AFA3-4E82-425F-9C75-AAED6D4C8B03}" destId="{D3D3E366-72B5-40B4-ACE4-6FC24E9769CD}" srcOrd="0" destOrd="0" presId="urn:microsoft.com/office/officeart/2005/8/layout/hList1"/>
+    <dgm:cxn modelId="{8D553937-B416-4A21-B164-8A44835DD6B1}" type="presParOf" srcId="{31F2AFA3-4E82-425F-9C75-AAED6D4C8B03}" destId="{BF7D177A-0EAE-4248-8759-F3933EE50CAC}" srcOrd="1" destOrd="0" presId="urn:microsoft.com/office/officeart/2005/8/layout/hList1"/>
+  </dgm:cxnLst>
+  <dgm:bg/>
+  <dgm:whole/>
+  <dgm:extLst>
+    <a:ext uri="http://schemas.microsoft.com/office/drawing/2008/diagram">
+      <dsp:dataModelExt xmlns:dsp="http://schemas.microsoft.com/office/drawing/2008/diagram" relId="rId6" minVer="http://schemas.openxmlformats.org/drawingml/2006/diagram"/>
+    </a:ext>
+  </dgm:extLst>
+</dgm:dataModel>
+</file>
+
+<file path=ppt/diagrams/data3.xml><?xml version="1.0" encoding="utf-8"?>
+<dgm:dataModel xmlns:dgm="http://schemas.openxmlformats.org/drawingml/2006/diagram" xmlns:a="http://schemas.openxmlformats.org/drawingml/2006/main">
+  <dgm:ptLst>
+    <dgm:pt modelId="{48E4E113-BF2E-44BA-9852-10B0B9620E1B}" type="doc">
+      <dgm:prSet loTypeId="urn:microsoft.com/office/officeart/2005/8/layout/hList1" loCatId="list" qsTypeId="urn:microsoft.com/office/officeart/2005/8/quickstyle/simple1" qsCatId="simple" csTypeId="urn:microsoft.com/office/officeart/2005/8/colors/accent1_2" csCatId="accent1" phldr="1"/>
+      <dgm:spPr/>
+      <dgm:t>
+        <a:bodyPr/>
+        <a:lstStyle/>
+        <a:p>
+          <a:endParaRPr lang="en-GB"/>
+        </a:p>
+      </dgm:t>
+    </dgm:pt>
+    <dgm:pt modelId="{36A0B9BE-4CA2-402A-A81D-5D24B07F8E29}">
+      <dgm:prSet phldrT="[Text]" phldr="0"/>
+      <dgm:spPr/>
+      <dgm:t>
+        <a:bodyPr/>
+        <a:lstStyle/>
+        <a:p>
+          <a:r>
+            <a:rPr lang="en-GB" dirty="0"/>
+            <a:t>Layout.html</a:t>
+          </a:r>
+        </a:p>
+      </dgm:t>
+    </dgm:pt>
+    <dgm:pt modelId="{303E710D-7E81-4F46-AD9C-E84F9AF6222B}" type="parTrans" cxnId="{F823C7A2-7791-4C89-8C5B-B679E6FC6334}">
+      <dgm:prSet/>
+      <dgm:spPr/>
+      <dgm:t>
+        <a:bodyPr/>
+        <a:lstStyle/>
+        <a:p>
+          <a:endParaRPr lang="en-GB"/>
+        </a:p>
+      </dgm:t>
+    </dgm:pt>
+    <dgm:pt modelId="{8EC5A562-13AC-46BD-8799-FF9C47CD4FA8}" type="sibTrans" cxnId="{F823C7A2-7791-4C89-8C5B-B679E6FC6334}">
+      <dgm:prSet/>
+      <dgm:spPr/>
+      <dgm:t>
+        <a:bodyPr/>
+        <a:lstStyle/>
+        <a:p>
+          <a:endParaRPr lang="en-GB"/>
+        </a:p>
+      </dgm:t>
+    </dgm:pt>
+    <dgm:pt modelId="{89F8B676-3FAD-4958-9C79-E52D85464493}">
+      <dgm:prSet phldrT="[Text]" phldr="0"/>
+      <dgm:spPr/>
+      <dgm:t>
+        <a:bodyPr/>
+        <a:lstStyle/>
+        <a:p>
+          <a:r>
+            <a:rPr lang="en-GB" dirty="0"/>
+            <a:t>About.html</a:t>
+          </a:r>
+        </a:p>
+      </dgm:t>
+    </dgm:pt>
+    <dgm:pt modelId="{E96A745A-5785-4D0D-BE32-F9256DB862A8}" type="parTrans" cxnId="{3783A2C6-C016-4252-9C10-B3D7C95CCD43}">
+      <dgm:prSet/>
+      <dgm:spPr/>
+      <dgm:t>
+        <a:bodyPr/>
+        <a:lstStyle/>
+        <a:p>
+          <a:endParaRPr lang="en-GB"/>
+        </a:p>
+      </dgm:t>
+    </dgm:pt>
+    <dgm:pt modelId="{75D366A8-C049-44D2-9065-24DF6FE75BEB}" type="sibTrans" cxnId="{3783A2C6-C016-4252-9C10-B3D7C95CCD43}">
+      <dgm:prSet/>
+      <dgm:spPr/>
+      <dgm:t>
+        <a:bodyPr/>
+        <a:lstStyle/>
+        <a:p>
+          <a:endParaRPr lang="en-GB"/>
+        </a:p>
+      </dgm:t>
+    </dgm:pt>
+    <dgm:pt modelId="{BF4CA1A4-C5C5-463D-8A88-FA69EBDE8842}">
+      <dgm:prSet phldrT="[Text]" phldr="0"/>
+      <dgm:spPr/>
+      <dgm:t>
+        <a:bodyPr/>
+        <a:lstStyle/>
+        <a:p>
+          <a:r>
+            <a:rPr lang="en-GB" dirty="0"/>
+            <a:t>Contact.html</a:t>
+          </a:r>
+        </a:p>
+      </dgm:t>
+    </dgm:pt>
+    <dgm:pt modelId="{34ED70AB-F070-4FAA-808A-CA48E3A533C0}" type="parTrans" cxnId="{2EFAF21D-34CA-4189-B966-E2218012C0B9}">
+      <dgm:prSet/>
+      <dgm:spPr/>
+      <dgm:t>
+        <a:bodyPr/>
+        <a:lstStyle/>
+        <a:p>
+          <a:endParaRPr lang="en-GB"/>
+        </a:p>
+      </dgm:t>
+    </dgm:pt>
+    <dgm:pt modelId="{ABAFC1BD-CC8A-44B6-B7E4-676C63ABB323}" type="sibTrans" cxnId="{2EFAF21D-34CA-4189-B966-E2218012C0B9}">
+      <dgm:prSet/>
+      <dgm:spPr/>
+      <dgm:t>
+        <a:bodyPr/>
+        <a:lstStyle/>
+        <a:p>
+          <a:endParaRPr lang="en-GB"/>
+        </a:p>
+      </dgm:t>
+    </dgm:pt>
+    <dgm:pt modelId="{309A0203-ECC9-4227-96B6-1AE522CE5742}">
+      <dgm:prSet phldrT="[Text]" phldr="0"/>
+      <dgm:spPr/>
+      <dgm:t>
+        <a:bodyPr/>
+        <a:lstStyle/>
+        <a:p>
+          <a:r>
+            <a:rPr lang="en-GB" dirty="0"/>
+            <a:t>Index.html</a:t>
+          </a:r>
+        </a:p>
+      </dgm:t>
+    </dgm:pt>
+    <dgm:pt modelId="{68428FC1-E40B-4BDC-A26F-590297D85CC5}" type="parTrans" cxnId="{BDFE3811-8F42-4924-80F5-28817C1E4830}">
+      <dgm:prSet/>
+      <dgm:spPr/>
+      <dgm:t>
+        <a:bodyPr/>
+        <a:lstStyle/>
+        <a:p>
+          <a:endParaRPr lang="en-GB"/>
+        </a:p>
+      </dgm:t>
+    </dgm:pt>
+    <dgm:pt modelId="{89F9D89F-D122-413C-B3E0-1D8AF811F4D7}" type="sibTrans" cxnId="{BDFE3811-8F42-4924-80F5-28817C1E4830}">
+      <dgm:prSet/>
+      <dgm:spPr/>
+      <dgm:t>
+        <a:bodyPr/>
+        <a:lstStyle/>
+        <a:p>
+          <a:endParaRPr lang="en-GB"/>
+        </a:p>
+      </dgm:t>
+    </dgm:pt>
+    <dgm:pt modelId="{D9DF4FDC-A93B-498B-858B-0B54656E5B57}">
+      <dgm:prSet phldrT="[Text]" phldr="0" custT="1"/>
+      <dgm:spPr/>
+      <dgm:t>
+        <a:bodyPr/>
+        <a:lstStyle/>
+        <a:p>
+          <a:endParaRPr lang="en-GB" sz="2000" dirty="0"/>
+        </a:p>
+      </dgm:t>
+    </dgm:pt>
+    <dgm:pt modelId="{01F3B99E-2DEE-46D5-A810-C544D6E6A6BD}" type="parTrans" cxnId="{F62FBBF8-4D66-4146-B63E-F4AB99858622}">
+      <dgm:prSet/>
+      <dgm:spPr/>
+      <dgm:t>
+        <a:bodyPr/>
+        <a:lstStyle/>
+        <a:p>
+          <a:endParaRPr lang="en-GB"/>
+        </a:p>
+      </dgm:t>
+    </dgm:pt>
+    <dgm:pt modelId="{C5E9E10C-48D2-4E9C-843F-AC0E8A441C3D}" type="sibTrans" cxnId="{F62FBBF8-4D66-4146-B63E-F4AB99858622}">
+      <dgm:prSet/>
+      <dgm:spPr/>
+      <dgm:t>
+        <a:bodyPr/>
+        <a:lstStyle/>
+        <a:p>
+          <a:endParaRPr lang="en-GB"/>
+        </a:p>
+      </dgm:t>
+    </dgm:pt>
+    <dgm:pt modelId="{99A747C7-7622-4FF3-B9BF-8573D665A36A}" type="pres">
+      <dgm:prSet presAssocID="{48E4E113-BF2E-44BA-9852-10B0B9620E1B}" presName="Name0" presStyleCnt="0">
+        <dgm:presLayoutVars>
+          <dgm:dir/>
+          <dgm:animLvl val="lvl"/>
+          <dgm:resizeHandles val="exact"/>
+        </dgm:presLayoutVars>
+      </dgm:prSet>
+      <dgm:spPr/>
+    </dgm:pt>
+    <dgm:pt modelId="{04C0E908-5AA5-4729-964E-49A87A8C7FE6}" type="pres">
+      <dgm:prSet presAssocID="{36A0B9BE-4CA2-402A-A81D-5D24B07F8E29}" presName="composite" presStyleCnt="0"/>
+      <dgm:spPr/>
+    </dgm:pt>
+    <dgm:pt modelId="{F6D0B44E-A67F-4AA3-ADD5-732D5DE8AB22}" type="pres">
+      <dgm:prSet presAssocID="{36A0B9BE-4CA2-402A-A81D-5D24B07F8E29}" presName="parTx" presStyleLbl="alignNode1" presStyleIdx="0" presStyleCnt="4">
+        <dgm:presLayoutVars>
+          <dgm:chMax val="0"/>
+          <dgm:chPref val="0"/>
+          <dgm:bulletEnabled val="1"/>
+        </dgm:presLayoutVars>
+      </dgm:prSet>
+      <dgm:spPr/>
+    </dgm:pt>
+    <dgm:pt modelId="{34D8098B-E7BB-4D71-B992-218315005147}" type="pres">
+      <dgm:prSet presAssocID="{36A0B9BE-4CA2-402A-A81D-5D24B07F8E29}" presName="desTx" presStyleLbl="alignAccFollowNode1" presStyleIdx="0" presStyleCnt="4">
+        <dgm:presLayoutVars>
+          <dgm:bulletEnabled val="1"/>
+        </dgm:presLayoutVars>
+      </dgm:prSet>
+      <dgm:spPr/>
+    </dgm:pt>
+    <dgm:pt modelId="{A0688140-F58F-4215-89F7-DB104E3027A2}" type="pres">
+      <dgm:prSet presAssocID="{8EC5A562-13AC-46BD-8799-FF9C47CD4FA8}" presName="space" presStyleCnt="0"/>
+      <dgm:spPr/>
+    </dgm:pt>
+    <dgm:pt modelId="{A75E9B72-C19E-4B08-A51A-7AF835A30CA5}" type="pres">
+      <dgm:prSet presAssocID="{309A0203-ECC9-4227-96B6-1AE522CE5742}" presName="composite" presStyleCnt="0"/>
+      <dgm:spPr/>
+    </dgm:pt>
+    <dgm:pt modelId="{63467DEE-4DBB-40E9-9C79-7902EDEA9617}" type="pres">
+      <dgm:prSet presAssocID="{309A0203-ECC9-4227-96B6-1AE522CE5742}" presName="parTx" presStyleLbl="alignNode1" presStyleIdx="1" presStyleCnt="4">
+        <dgm:presLayoutVars>
+          <dgm:chMax val="0"/>
+          <dgm:chPref val="0"/>
+          <dgm:bulletEnabled val="1"/>
+        </dgm:presLayoutVars>
+      </dgm:prSet>
+      <dgm:spPr/>
+    </dgm:pt>
+    <dgm:pt modelId="{6723CEA6-F7D9-4136-8376-6BBF528D685B}" type="pres">
+      <dgm:prSet presAssocID="{309A0203-ECC9-4227-96B6-1AE522CE5742}" presName="desTx" presStyleLbl="alignAccFollowNode1" presStyleIdx="1" presStyleCnt="4">
+        <dgm:presLayoutVars>
+          <dgm:bulletEnabled val="1"/>
+        </dgm:presLayoutVars>
+      </dgm:prSet>
+      <dgm:spPr/>
+    </dgm:pt>
+    <dgm:pt modelId="{7E007A80-C2DD-4ABD-A0F2-86BC98953C8C}" type="pres">
+      <dgm:prSet presAssocID="{89F9D89F-D122-413C-B3E0-1D8AF811F4D7}" presName="space" presStyleCnt="0"/>
+      <dgm:spPr/>
+    </dgm:pt>
+    <dgm:pt modelId="{78722815-074B-47EA-A8DF-3C29EC3C48A4}" type="pres">
+      <dgm:prSet presAssocID="{89F8B676-3FAD-4958-9C79-E52D85464493}" presName="composite" presStyleCnt="0"/>
+      <dgm:spPr/>
+    </dgm:pt>
+    <dgm:pt modelId="{821120DC-C865-40BE-B9ED-E47BE014AE8C}" type="pres">
+      <dgm:prSet presAssocID="{89F8B676-3FAD-4958-9C79-E52D85464493}" presName="parTx" presStyleLbl="alignNode1" presStyleIdx="2" presStyleCnt="4">
+        <dgm:presLayoutVars>
+          <dgm:chMax val="0"/>
+          <dgm:chPref val="0"/>
+          <dgm:bulletEnabled val="1"/>
+        </dgm:presLayoutVars>
+      </dgm:prSet>
+      <dgm:spPr/>
+    </dgm:pt>
+    <dgm:pt modelId="{5365651C-1395-42B1-B455-75CC18FDB480}" type="pres">
+      <dgm:prSet presAssocID="{89F8B676-3FAD-4958-9C79-E52D85464493}" presName="desTx" presStyleLbl="alignAccFollowNode1" presStyleIdx="2" presStyleCnt="4">
+        <dgm:presLayoutVars>
+          <dgm:bulletEnabled val="1"/>
+        </dgm:presLayoutVars>
+      </dgm:prSet>
+      <dgm:spPr/>
+    </dgm:pt>
+    <dgm:pt modelId="{31A61769-84BE-4E7C-AEC5-C8F8AC95E429}" type="pres">
+      <dgm:prSet presAssocID="{75D366A8-C049-44D2-9065-24DF6FE75BEB}" presName="space" presStyleCnt="0"/>
+      <dgm:spPr/>
+    </dgm:pt>
+    <dgm:pt modelId="{31F2AFA3-4E82-425F-9C75-AAED6D4C8B03}" type="pres">
+      <dgm:prSet presAssocID="{BF4CA1A4-C5C5-463D-8A88-FA69EBDE8842}" presName="composite" presStyleCnt="0"/>
+      <dgm:spPr/>
+    </dgm:pt>
+    <dgm:pt modelId="{D3D3E366-72B5-40B4-ACE4-6FC24E9769CD}" type="pres">
+      <dgm:prSet presAssocID="{BF4CA1A4-C5C5-463D-8A88-FA69EBDE8842}" presName="parTx" presStyleLbl="alignNode1" presStyleIdx="3" presStyleCnt="4">
+        <dgm:presLayoutVars>
+          <dgm:chMax val="0"/>
+          <dgm:chPref val="0"/>
+          <dgm:bulletEnabled val="1"/>
+        </dgm:presLayoutVars>
+      </dgm:prSet>
+      <dgm:spPr/>
+    </dgm:pt>
+    <dgm:pt modelId="{BF7D177A-0EAE-4248-8759-F3933EE50CAC}" type="pres">
+      <dgm:prSet presAssocID="{BF4CA1A4-C5C5-463D-8A88-FA69EBDE8842}" presName="desTx" presStyleLbl="alignAccFollowNode1" presStyleIdx="3" presStyleCnt="4">
+        <dgm:presLayoutVars>
+          <dgm:bulletEnabled val="1"/>
+        </dgm:presLayoutVars>
+      </dgm:prSet>
+      <dgm:spPr/>
+    </dgm:pt>
+  </dgm:ptLst>
+  <dgm:cxnLst>
+    <dgm:cxn modelId="{BDFE3811-8F42-4924-80F5-28817C1E4830}" srcId="{48E4E113-BF2E-44BA-9852-10B0B9620E1B}" destId="{309A0203-ECC9-4227-96B6-1AE522CE5742}" srcOrd="1" destOrd="0" parTransId="{68428FC1-E40B-4BDC-A26F-590297D85CC5}" sibTransId="{89F9D89F-D122-413C-B3E0-1D8AF811F4D7}"/>
+    <dgm:cxn modelId="{02D54513-C033-4911-AEB7-838B89F5F2E1}" type="presOf" srcId="{D9DF4FDC-A93B-498B-858B-0B54656E5B57}" destId="{34D8098B-E7BB-4D71-B992-218315005147}" srcOrd="0" destOrd="0" presId="urn:microsoft.com/office/officeart/2005/8/layout/hList1"/>
+    <dgm:cxn modelId="{BA5ED919-D1FE-4667-B781-7BCCA3DEC90C}" type="presOf" srcId="{48E4E113-BF2E-44BA-9852-10B0B9620E1B}" destId="{99A747C7-7622-4FF3-B9BF-8573D665A36A}" srcOrd="0" destOrd="0" presId="urn:microsoft.com/office/officeart/2005/8/layout/hList1"/>
+    <dgm:cxn modelId="{2EFAF21D-34CA-4189-B966-E2218012C0B9}" srcId="{48E4E113-BF2E-44BA-9852-10B0B9620E1B}" destId="{BF4CA1A4-C5C5-463D-8A88-FA69EBDE8842}" srcOrd="3" destOrd="0" parTransId="{34ED70AB-F070-4FAA-808A-CA48E3A533C0}" sibTransId="{ABAFC1BD-CC8A-44B6-B7E4-676C63ABB323}"/>
+    <dgm:cxn modelId="{1DEAD870-5C88-463E-86F2-393BDC251344}" type="presOf" srcId="{89F8B676-3FAD-4958-9C79-E52D85464493}" destId="{821120DC-C865-40BE-B9ED-E47BE014AE8C}" srcOrd="0" destOrd="0" presId="urn:microsoft.com/office/officeart/2005/8/layout/hList1"/>
+    <dgm:cxn modelId="{057F1D71-4528-4C21-8641-D35932080E26}" type="presOf" srcId="{BF4CA1A4-C5C5-463D-8A88-FA69EBDE8842}" destId="{D3D3E366-72B5-40B4-ACE4-6FC24E9769CD}" srcOrd="0" destOrd="0" presId="urn:microsoft.com/office/officeart/2005/8/layout/hList1"/>
+    <dgm:cxn modelId="{2FEF3F96-F800-4692-AC88-883D80A8EE11}" type="presOf" srcId="{309A0203-ECC9-4227-96B6-1AE522CE5742}" destId="{63467DEE-4DBB-40E9-9C79-7902EDEA9617}" srcOrd="0" destOrd="0" presId="urn:microsoft.com/office/officeart/2005/8/layout/hList1"/>
+    <dgm:cxn modelId="{EFD65D9F-10F8-4C75-A6C4-F90F60C0E9D1}" type="presOf" srcId="{36A0B9BE-4CA2-402A-A81D-5D24B07F8E29}" destId="{F6D0B44E-A67F-4AA3-ADD5-732D5DE8AB22}" srcOrd="0" destOrd="0" presId="urn:microsoft.com/office/officeart/2005/8/layout/hList1"/>
+    <dgm:cxn modelId="{F823C7A2-7791-4C89-8C5B-B679E6FC6334}" srcId="{48E4E113-BF2E-44BA-9852-10B0B9620E1B}" destId="{36A0B9BE-4CA2-402A-A81D-5D24B07F8E29}" srcOrd="0" destOrd="0" parTransId="{303E710D-7E81-4F46-AD9C-E84F9AF6222B}" sibTransId="{8EC5A562-13AC-46BD-8799-FF9C47CD4FA8}"/>
+    <dgm:cxn modelId="{3783A2C6-C016-4252-9C10-B3D7C95CCD43}" srcId="{48E4E113-BF2E-44BA-9852-10B0B9620E1B}" destId="{89F8B676-3FAD-4958-9C79-E52D85464493}" srcOrd="2" destOrd="0" parTransId="{E96A745A-5785-4D0D-BE32-F9256DB862A8}" sibTransId="{75D366A8-C049-44D2-9065-24DF6FE75BEB}"/>
     <dgm:cxn modelId="{F62FBBF8-4D66-4146-B63E-F4AB99858622}" srcId="{36A0B9BE-4CA2-402A-A81D-5D24B07F8E29}" destId="{D9DF4FDC-A93B-498B-858B-0B54656E5B57}" srcOrd="0" destOrd="0" parTransId="{01F3B99E-2DEE-46D5-A810-C544D6E6A6BD}" sibTransId="{C5E9E10C-48D2-4E9C-843F-AC0E8A441C3D}"/>
     <dgm:cxn modelId="{8700DEE9-9A8E-48F7-8AFD-6A0A46A87773}" type="presParOf" srcId="{99A747C7-7622-4FF3-B9BF-8573D665A36A}" destId="{04C0E908-5AA5-4729-964E-49A87A8C7FE6}" srcOrd="0" destOrd="0" presId="urn:microsoft.com/office/officeart/2005/8/layout/hList1"/>
     <dgm:cxn modelId="{B2EDAB54-7CCE-4826-9542-BD3164605AFD}" type="presParOf" srcId="{04C0E908-5AA5-4729-964E-49A87A8C7FE6}" destId="{F6D0B44E-A67F-4AA3-ADD5-732D5DE8AB22}" srcOrd="0" destOrd="0" presId="urn:microsoft.com/office/officeart/2005/8/layout/hList1"/>
@@ -3304,6 +4391,563 @@
 </dsp:drawing>
 </file>
 
+<file path=ppt/diagrams/drawing3.xml><?xml version="1.0" encoding="utf-8"?>
+<dsp:drawing xmlns:dgm="http://schemas.openxmlformats.org/drawingml/2006/diagram" xmlns:dsp="http://schemas.microsoft.com/office/drawing/2008/diagram" xmlns:a="http://schemas.openxmlformats.org/drawingml/2006/main">
+  <dsp:spTree>
+    <dsp:nvGrpSpPr>
+      <dsp:cNvPr id="0" name=""/>
+      <dsp:cNvGrpSpPr/>
+    </dsp:nvGrpSpPr>
+    <dsp:grpSpPr/>
+    <dsp:sp modelId="{F6D0B44E-A67F-4AA3-ADD5-732D5DE8AB22}">
+      <dsp:nvSpPr>
+        <dsp:cNvPr id="0" name=""/>
+        <dsp:cNvSpPr/>
+      </dsp:nvSpPr>
+      <dsp:spPr>
+        <a:xfrm>
+          <a:off x="2510" y="433136"/>
+          <a:ext cx="1509400" cy="489600"/>
+        </a:xfrm>
+        <a:prstGeom prst="rect">
+          <a:avLst/>
+        </a:prstGeom>
+        <a:solidFill>
+          <a:schemeClr val="accent1">
+            <a:hueOff val="0"/>
+            <a:satOff val="0"/>
+            <a:lumOff val="0"/>
+            <a:alphaOff val="0"/>
+          </a:schemeClr>
+        </a:solidFill>
+        <a:ln w="19050" cap="flat" cmpd="sng" algn="ctr">
+          <a:solidFill>
+            <a:schemeClr val="accent1">
+              <a:hueOff val="0"/>
+              <a:satOff val="0"/>
+              <a:lumOff val="0"/>
+              <a:alphaOff val="0"/>
+            </a:schemeClr>
+          </a:solidFill>
+          <a:prstDash val="solid"/>
+          <a:miter lim="800000"/>
+        </a:ln>
+        <a:effectLst/>
+      </dsp:spPr>
+      <dsp:style>
+        <a:lnRef idx="2">
+          <a:scrgbClr r="0" g="0" b="0"/>
+        </a:lnRef>
+        <a:fillRef idx="1">
+          <a:scrgbClr r="0" g="0" b="0"/>
+        </a:fillRef>
+        <a:effectRef idx="0">
+          <a:scrgbClr r="0" g="0" b="0"/>
+        </a:effectRef>
+        <a:fontRef idx="minor">
+          <a:schemeClr val="lt1"/>
+        </a:fontRef>
+      </dsp:style>
+      <dsp:txBody>
+        <a:bodyPr spcFirstLastPara="0" vert="horz" wrap="square" lIns="120904" tIns="69088" rIns="120904" bIns="69088" numCol="1" spcCol="1270" anchor="ctr" anchorCtr="0">
+          <a:noAutofit/>
+        </a:bodyPr>
+        <a:lstStyle/>
+        <a:p>
+          <a:pPr marL="0" lvl="0" indent="0" algn="ctr" defTabSz="755650">
+            <a:lnSpc>
+              <a:spcPct val="90000"/>
+            </a:lnSpc>
+            <a:spcBef>
+              <a:spcPct val="0"/>
+            </a:spcBef>
+            <a:spcAft>
+              <a:spcPct val="35000"/>
+            </a:spcAft>
+            <a:buNone/>
+          </a:pPr>
+          <a:r>
+            <a:rPr lang="en-GB" sz="1700" kern="1200" dirty="0"/>
+            <a:t>Layout.html</a:t>
+          </a:r>
+        </a:p>
+      </dsp:txBody>
+      <dsp:txXfrm>
+        <a:off x="2510" y="433136"/>
+        <a:ext cx="1509400" cy="489600"/>
+      </dsp:txXfrm>
+    </dsp:sp>
+    <dsp:sp modelId="{34D8098B-E7BB-4D71-B992-218315005147}">
+      <dsp:nvSpPr>
+        <dsp:cNvPr id="0" name=""/>
+        <dsp:cNvSpPr/>
+      </dsp:nvSpPr>
+      <dsp:spPr>
+        <a:xfrm>
+          <a:off x="2510" y="922737"/>
+          <a:ext cx="1509400" cy="746639"/>
+        </a:xfrm>
+        <a:prstGeom prst="rect">
+          <a:avLst/>
+        </a:prstGeom>
+        <a:solidFill>
+          <a:schemeClr val="accent1">
+            <a:alpha val="90000"/>
+            <a:tint val="40000"/>
+            <a:hueOff val="0"/>
+            <a:satOff val="0"/>
+            <a:lumOff val="0"/>
+            <a:alphaOff val="0"/>
+          </a:schemeClr>
+        </a:solidFill>
+        <a:ln w="19050" cap="flat" cmpd="sng" algn="ctr">
+          <a:solidFill>
+            <a:schemeClr val="accent1">
+              <a:alpha val="90000"/>
+              <a:tint val="40000"/>
+              <a:hueOff val="0"/>
+              <a:satOff val="0"/>
+              <a:lumOff val="0"/>
+              <a:alphaOff val="0"/>
+            </a:schemeClr>
+          </a:solidFill>
+          <a:prstDash val="solid"/>
+          <a:miter lim="800000"/>
+        </a:ln>
+        <a:effectLst/>
+      </dsp:spPr>
+      <dsp:style>
+        <a:lnRef idx="2">
+          <a:scrgbClr r="0" g="0" b="0"/>
+        </a:lnRef>
+        <a:fillRef idx="1">
+          <a:scrgbClr r="0" g="0" b="0"/>
+        </a:fillRef>
+        <a:effectRef idx="0">
+          <a:scrgbClr r="0" g="0" b="0"/>
+        </a:effectRef>
+        <a:fontRef idx="minor"/>
+      </dsp:style>
+      <dsp:txBody>
+        <a:bodyPr spcFirstLastPara="0" vert="horz" wrap="square" lIns="106680" tIns="106680" rIns="142240" bIns="160020" numCol="1" spcCol="1270" anchor="t" anchorCtr="0">
+          <a:noAutofit/>
+        </a:bodyPr>
+        <a:lstStyle/>
+        <a:p>
+          <a:pPr marL="228600" lvl="1" indent="-228600" algn="l" defTabSz="889000">
+            <a:lnSpc>
+              <a:spcPct val="90000"/>
+            </a:lnSpc>
+            <a:spcBef>
+              <a:spcPct val="0"/>
+            </a:spcBef>
+            <a:spcAft>
+              <a:spcPct val="15000"/>
+            </a:spcAft>
+            <a:buChar char="•"/>
+          </a:pPr>
+          <a:endParaRPr lang="en-GB" sz="2000" kern="1200" dirty="0"/>
+        </a:p>
+      </dsp:txBody>
+      <dsp:txXfrm>
+        <a:off x="2510" y="922737"/>
+        <a:ext cx="1509400" cy="746639"/>
+      </dsp:txXfrm>
+    </dsp:sp>
+    <dsp:sp modelId="{63467DEE-4DBB-40E9-9C79-7902EDEA9617}">
+      <dsp:nvSpPr>
+        <dsp:cNvPr id="0" name=""/>
+        <dsp:cNvSpPr/>
+      </dsp:nvSpPr>
+      <dsp:spPr>
+        <a:xfrm>
+          <a:off x="1723226" y="433136"/>
+          <a:ext cx="1509400" cy="489600"/>
+        </a:xfrm>
+        <a:prstGeom prst="rect">
+          <a:avLst/>
+        </a:prstGeom>
+        <a:solidFill>
+          <a:schemeClr val="accent1">
+            <a:hueOff val="0"/>
+            <a:satOff val="0"/>
+            <a:lumOff val="0"/>
+            <a:alphaOff val="0"/>
+          </a:schemeClr>
+        </a:solidFill>
+        <a:ln w="19050" cap="flat" cmpd="sng" algn="ctr">
+          <a:solidFill>
+            <a:schemeClr val="accent1">
+              <a:hueOff val="0"/>
+              <a:satOff val="0"/>
+              <a:lumOff val="0"/>
+              <a:alphaOff val="0"/>
+            </a:schemeClr>
+          </a:solidFill>
+          <a:prstDash val="solid"/>
+          <a:miter lim="800000"/>
+        </a:ln>
+        <a:effectLst/>
+      </dsp:spPr>
+      <dsp:style>
+        <a:lnRef idx="2">
+          <a:scrgbClr r="0" g="0" b="0"/>
+        </a:lnRef>
+        <a:fillRef idx="1">
+          <a:scrgbClr r="0" g="0" b="0"/>
+        </a:fillRef>
+        <a:effectRef idx="0">
+          <a:scrgbClr r="0" g="0" b="0"/>
+        </a:effectRef>
+        <a:fontRef idx="minor">
+          <a:schemeClr val="lt1"/>
+        </a:fontRef>
+      </dsp:style>
+      <dsp:txBody>
+        <a:bodyPr spcFirstLastPara="0" vert="horz" wrap="square" lIns="120904" tIns="69088" rIns="120904" bIns="69088" numCol="1" spcCol="1270" anchor="ctr" anchorCtr="0">
+          <a:noAutofit/>
+        </a:bodyPr>
+        <a:lstStyle/>
+        <a:p>
+          <a:pPr marL="0" lvl="0" indent="0" algn="ctr" defTabSz="755650">
+            <a:lnSpc>
+              <a:spcPct val="90000"/>
+            </a:lnSpc>
+            <a:spcBef>
+              <a:spcPct val="0"/>
+            </a:spcBef>
+            <a:spcAft>
+              <a:spcPct val="35000"/>
+            </a:spcAft>
+            <a:buNone/>
+          </a:pPr>
+          <a:r>
+            <a:rPr lang="en-GB" sz="1700" kern="1200" dirty="0"/>
+            <a:t>Index.html</a:t>
+          </a:r>
+        </a:p>
+      </dsp:txBody>
+      <dsp:txXfrm>
+        <a:off x="1723226" y="433136"/>
+        <a:ext cx="1509400" cy="489600"/>
+      </dsp:txXfrm>
+    </dsp:sp>
+    <dsp:sp modelId="{6723CEA6-F7D9-4136-8376-6BBF528D685B}">
+      <dsp:nvSpPr>
+        <dsp:cNvPr id="0" name=""/>
+        <dsp:cNvSpPr/>
+      </dsp:nvSpPr>
+      <dsp:spPr>
+        <a:xfrm>
+          <a:off x="1723226" y="922737"/>
+          <a:ext cx="1509400" cy="746639"/>
+        </a:xfrm>
+        <a:prstGeom prst="rect">
+          <a:avLst/>
+        </a:prstGeom>
+        <a:solidFill>
+          <a:schemeClr val="accent1">
+            <a:alpha val="90000"/>
+            <a:tint val="40000"/>
+            <a:hueOff val="0"/>
+            <a:satOff val="0"/>
+            <a:lumOff val="0"/>
+            <a:alphaOff val="0"/>
+          </a:schemeClr>
+        </a:solidFill>
+        <a:ln w="19050" cap="flat" cmpd="sng" algn="ctr">
+          <a:solidFill>
+            <a:schemeClr val="accent1">
+              <a:alpha val="90000"/>
+              <a:tint val="40000"/>
+              <a:hueOff val="0"/>
+              <a:satOff val="0"/>
+              <a:lumOff val="0"/>
+              <a:alphaOff val="0"/>
+            </a:schemeClr>
+          </a:solidFill>
+          <a:prstDash val="solid"/>
+          <a:miter lim="800000"/>
+        </a:ln>
+        <a:effectLst/>
+      </dsp:spPr>
+      <dsp:style>
+        <a:lnRef idx="2">
+          <a:scrgbClr r="0" g="0" b="0"/>
+        </a:lnRef>
+        <a:fillRef idx="1">
+          <a:scrgbClr r="0" g="0" b="0"/>
+        </a:fillRef>
+        <a:effectRef idx="0">
+          <a:scrgbClr r="0" g="0" b="0"/>
+        </a:effectRef>
+        <a:fontRef idx="minor"/>
+      </dsp:style>
+    </dsp:sp>
+    <dsp:sp modelId="{821120DC-C865-40BE-B9ED-E47BE014AE8C}">
+      <dsp:nvSpPr>
+        <dsp:cNvPr id="0" name=""/>
+        <dsp:cNvSpPr/>
+      </dsp:nvSpPr>
+      <dsp:spPr>
+        <a:xfrm>
+          <a:off x="3443943" y="433136"/>
+          <a:ext cx="1509400" cy="489600"/>
+        </a:xfrm>
+        <a:prstGeom prst="rect">
+          <a:avLst/>
+        </a:prstGeom>
+        <a:solidFill>
+          <a:schemeClr val="accent1">
+            <a:hueOff val="0"/>
+            <a:satOff val="0"/>
+            <a:lumOff val="0"/>
+            <a:alphaOff val="0"/>
+          </a:schemeClr>
+        </a:solidFill>
+        <a:ln w="19050" cap="flat" cmpd="sng" algn="ctr">
+          <a:solidFill>
+            <a:schemeClr val="accent1">
+              <a:hueOff val="0"/>
+              <a:satOff val="0"/>
+              <a:lumOff val="0"/>
+              <a:alphaOff val="0"/>
+            </a:schemeClr>
+          </a:solidFill>
+          <a:prstDash val="solid"/>
+          <a:miter lim="800000"/>
+        </a:ln>
+        <a:effectLst/>
+      </dsp:spPr>
+      <dsp:style>
+        <a:lnRef idx="2">
+          <a:scrgbClr r="0" g="0" b="0"/>
+        </a:lnRef>
+        <a:fillRef idx="1">
+          <a:scrgbClr r="0" g="0" b="0"/>
+        </a:fillRef>
+        <a:effectRef idx="0">
+          <a:scrgbClr r="0" g="0" b="0"/>
+        </a:effectRef>
+        <a:fontRef idx="minor">
+          <a:schemeClr val="lt1"/>
+        </a:fontRef>
+      </dsp:style>
+      <dsp:txBody>
+        <a:bodyPr spcFirstLastPara="0" vert="horz" wrap="square" lIns="120904" tIns="69088" rIns="120904" bIns="69088" numCol="1" spcCol="1270" anchor="ctr" anchorCtr="0">
+          <a:noAutofit/>
+        </a:bodyPr>
+        <a:lstStyle/>
+        <a:p>
+          <a:pPr marL="0" lvl="0" indent="0" algn="ctr" defTabSz="755650">
+            <a:lnSpc>
+              <a:spcPct val="90000"/>
+            </a:lnSpc>
+            <a:spcBef>
+              <a:spcPct val="0"/>
+            </a:spcBef>
+            <a:spcAft>
+              <a:spcPct val="35000"/>
+            </a:spcAft>
+            <a:buNone/>
+          </a:pPr>
+          <a:r>
+            <a:rPr lang="en-GB" sz="1700" kern="1200" dirty="0"/>
+            <a:t>About.html</a:t>
+          </a:r>
+        </a:p>
+      </dsp:txBody>
+      <dsp:txXfrm>
+        <a:off x="3443943" y="433136"/>
+        <a:ext cx="1509400" cy="489600"/>
+      </dsp:txXfrm>
+    </dsp:sp>
+    <dsp:sp modelId="{5365651C-1395-42B1-B455-75CC18FDB480}">
+      <dsp:nvSpPr>
+        <dsp:cNvPr id="0" name=""/>
+        <dsp:cNvSpPr/>
+      </dsp:nvSpPr>
+      <dsp:spPr>
+        <a:xfrm>
+          <a:off x="3443943" y="922737"/>
+          <a:ext cx="1509400" cy="746639"/>
+        </a:xfrm>
+        <a:prstGeom prst="rect">
+          <a:avLst/>
+        </a:prstGeom>
+        <a:solidFill>
+          <a:schemeClr val="accent1">
+            <a:alpha val="90000"/>
+            <a:tint val="40000"/>
+            <a:hueOff val="0"/>
+            <a:satOff val="0"/>
+            <a:lumOff val="0"/>
+            <a:alphaOff val="0"/>
+          </a:schemeClr>
+        </a:solidFill>
+        <a:ln w="19050" cap="flat" cmpd="sng" algn="ctr">
+          <a:solidFill>
+            <a:schemeClr val="accent1">
+              <a:alpha val="90000"/>
+              <a:tint val="40000"/>
+              <a:hueOff val="0"/>
+              <a:satOff val="0"/>
+              <a:lumOff val="0"/>
+              <a:alphaOff val="0"/>
+            </a:schemeClr>
+          </a:solidFill>
+          <a:prstDash val="solid"/>
+          <a:miter lim="800000"/>
+        </a:ln>
+        <a:effectLst/>
+      </dsp:spPr>
+      <dsp:style>
+        <a:lnRef idx="2">
+          <a:scrgbClr r="0" g="0" b="0"/>
+        </a:lnRef>
+        <a:fillRef idx="1">
+          <a:scrgbClr r="0" g="0" b="0"/>
+        </a:fillRef>
+        <a:effectRef idx="0">
+          <a:scrgbClr r="0" g="0" b="0"/>
+        </a:effectRef>
+        <a:fontRef idx="minor"/>
+      </dsp:style>
+    </dsp:sp>
+    <dsp:sp modelId="{D3D3E366-72B5-40B4-ACE4-6FC24E9769CD}">
+      <dsp:nvSpPr>
+        <dsp:cNvPr id="0" name=""/>
+        <dsp:cNvSpPr/>
+      </dsp:nvSpPr>
+      <dsp:spPr>
+        <a:xfrm>
+          <a:off x="5164660" y="433136"/>
+          <a:ext cx="1509400" cy="489600"/>
+        </a:xfrm>
+        <a:prstGeom prst="rect">
+          <a:avLst/>
+        </a:prstGeom>
+        <a:solidFill>
+          <a:schemeClr val="accent1">
+            <a:hueOff val="0"/>
+            <a:satOff val="0"/>
+            <a:lumOff val="0"/>
+            <a:alphaOff val="0"/>
+          </a:schemeClr>
+        </a:solidFill>
+        <a:ln w="19050" cap="flat" cmpd="sng" algn="ctr">
+          <a:solidFill>
+            <a:schemeClr val="accent1">
+              <a:hueOff val="0"/>
+              <a:satOff val="0"/>
+              <a:lumOff val="0"/>
+              <a:alphaOff val="0"/>
+            </a:schemeClr>
+          </a:solidFill>
+          <a:prstDash val="solid"/>
+          <a:miter lim="800000"/>
+        </a:ln>
+        <a:effectLst/>
+      </dsp:spPr>
+      <dsp:style>
+        <a:lnRef idx="2">
+          <a:scrgbClr r="0" g="0" b="0"/>
+        </a:lnRef>
+        <a:fillRef idx="1">
+          <a:scrgbClr r="0" g="0" b="0"/>
+        </a:fillRef>
+        <a:effectRef idx="0">
+          <a:scrgbClr r="0" g="0" b="0"/>
+        </a:effectRef>
+        <a:fontRef idx="minor">
+          <a:schemeClr val="lt1"/>
+        </a:fontRef>
+      </dsp:style>
+      <dsp:txBody>
+        <a:bodyPr spcFirstLastPara="0" vert="horz" wrap="square" lIns="120904" tIns="69088" rIns="120904" bIns="69088" numCol="1" spcCol="1270" anchor="ctr" anchorCtr="0">
+          <a:noAutofit/>
+        </a:bodyPr>
+        <a:lstStyle/>
+        <a:p>
+          <a:pPr marL="0" lvl="0" indent="0" algn="ctr" defTabSz="755650">
+            <a:lnSpc>
+              <a:spcPct val="90000"/>
+            </a:lnSpc>
+            <a:spcBef>
+              <a:spcPct val="0"/>
+            </a:spcBef>
+            <a:spcAft>
+              <a:spcPct val="35000"/>
+            </a:spcAft>
+            <a:buNone/>
+          </a:pPr>
+          <a:r>
+            <a:rPr lang="en-GB" sz="1700" kern="1200" dirty="0"/>
+            <a:t>Contact.html</a:t>
+          </a:r>
+        </a:p>
+      </dsp:txBody>
+      <dsp:txXfrm>
+        <a:off x="5164660" y="433136"/>
+        <a:ext cx="1509400" cy="489600"/>
+      </dsp:txXfrm>
+    </dsp:sp>
+    <dsp:sp modelId="{BF7D177A-0EAE-4248-8759-F3933EE50CAC}">
+      <dsp:nvSpPr>
+        <dsp:cNvPr id="0" name=""/>
+        <dsp:cNvSpPr/>
+      </dsp:nvSpPr>
+      <dsp:spPr>
+        <a:xfrm>
+          <a:off x="5164660" y="922737"/>
+          <a:ext cx="1509400" cy="746639"/>
+        </a:xfrm>
+        <a:prstGeom prst="rect">
+          <a:avLst/>
+        </a:prstGeom>
+        <a:solidFill>
+          <a:schemeClr val="accent1">
+            <a:alpha val="90000"/>
+            <a:tint val="40000"/>
+            <a:hueOff val="0"/>
+            <a:satOff val="0"/>
+            <a:lumOff val="0"/>
+            <a:alphaOff val="0"/>
+          </a:schemeClr>
+        </a:solidFill>
+        <a:ln w="19050" cap="flat" cmpd="sng" algn="ctr">
+          <a:solidFill>
+            <a:schemeClr val="accent1">
+              <a:alpha val="90000"/>
+              <a:tint val="40000"/>
+              <a:hueOff val="0"/>
+              <a:satOff val="0"/>
+              <a:lumOff val="0"/>
+              <a:alphaOff val="0"/>
+            </a:schemeClr>
+          </a:solidFill>
+          <a:prstDash val="solid"/>
+          <a:miter lim="800000"/>
+        </a:ln>
+        <a:effectLst/>
+      </dsp:spPr>
+      <dsp:style>
+        <a:lnRef idx="2">
+          <a:scrgbClr r="0" g="0" b="0"/>
+        </a:lnRef>
+        <a:fillRef idx="1">
+          <a:scrgbClr r="0" g="0" b="0"/>
+        </a:fillRef>
+        <a:effectRef idx="0">
+          <a:scrgbClr r="0" g="0" b="0"/>
+        </a:effectRef>
+        <a:fontRef idx="minor"/>
+      </dsp:style>
+    </dsp:sp>
+  </dsp:spTree>
+</dsp:drawing>
+</file>
+
 <file path=ppt/diagrams/layout1.xml><?xml version="1.0" encoding="utf-8"?>
 <dgm:layoutDef xmlns:dgm="http://schemas.openxmlformats.org/drawingml/2006/diagram" xmlns:a="http://schemas.openxmlformats.org/drawingml/2006/main" uniqueId="urn:microsoft.com/office/officeart/2005/8/layout/hList1">
   <dgm:title val=""/>
@@ -3738,6 +5382,223 @@
 </dgm:layoutDef>
 </file>
 
+<file path=ppt/diagrams/layout3.xml><?xml version="1.0" encoding="utf-8"?>
+<dgm:layoutDef xmlns:dgm="http://schemas.openxmlformats.org/drawingml/2006/diagram" xmlns:a="http://schemas.openxmlformats.org/drawingml/2006/main" uniqueId="urn:microsoft.com/office/officeart/2005/8/layout/hList1">
+  <dgm:title val=""/>
+  <dgm:desc val=""/>
+  <dgm:catLst>
+    <dgm:cat type="list" pri="5000"/>
+    <dgm:cat type="convert" pri="5000"/>
+  </dgm:catLst>
+  <dgm:sampData>
+    <dgm:dataModel>
+      <dgm:ptLst>
+        <dgm:pt modelId="0" type="doc"/>
+        <dgm:pt modelId="1">
+          <dgm:prSet phldr="1"/>
+        </dgm:pt>
+        <dgm:pt modelId="11">
+          <dgm:prSet phldr="1"/>
+        </dgm:pt>
+        <dgm:pt modelId="12">
+          <dgm:prSet phldr="1"/>
+        </dgm:pt>
+        <dgm:pt modelId="2">
+          <dgm:prSet phldr="1"/>
+        </dgm:pt>
+        <dgm:pt modelId="21">
+          <dgm:prSet phldr="1"/>
+        </dgm:pt>
+        <dgm:pt modelId="22">
+          <dgm:prSet phldr="1"/>
+        </dgm:pt>
+        <dgm:pt modelId="3">
+          <dgm:prSet phldr="1"/>
+        </dgm:pt>
+        <dgm:pt modelId="31">
+          <dgm:prSet phldr="1"/>
+        </dgm:pt>
+        <dgm:pt modelId="32">
+          <dgm:prSet phldr="1"/>
+        </dgm:pt>
+      </dgm:ptLst>
+      <dgm:cxnLst>
+        <dgm:cxn modelId="4" srcId="0" destId="1" srcOrd="0" destOrd="0"/>
+        <dgm:cxn modelId="5" srcId="0" destId="2" srcOrd="1" destOrd="0"/>
+        <dgm:cxn modelId="6" srcId="0" destId="3" srcOrd="2" destOrd="0"/>
+        <dgm:cxn modelId="13" srcId="1" destId="11" srcOrd="0" destOrd="0"/>
+        <dgm:cxn modelId="14" srcId="1" destId="12" srcOrd="1" destOrd="0"/>
+        <dgm:cxn modelId="23" srcId="2" destId="21" srcOrd="0" destOrd="0"/>
+        <dgm:cxn modelId="24" srcId="2" destId="22" srcOrd="1" destOrd="0"/>
+        <dgm:cxn modelId="33" srcId="3" destId="31" srcOrd="0" destOrd="0"/>
+        <dgm:cxn modelId="34" srcId="3" destId="32" srcOrd="1" destOrd="0"/>
+      </dgm:cxnLst>
+      <dgm:bg/>
+      <dgm:whole/>
+    </dgm:dataModel>
+  </dgm:sampData>
+  <dgm:styleData>
+    <dgm:dataModel>
+      <dgm:ptLst>
+        <dgm:pt modelId="0" type="doc"/>
+        <dgm:pt modelId="1">
+          <dgm:prSet phldr="1"/>
+        </dgm:pt>
+        <dgm:pt modelId="2">
+          <dgm:prSet phldr="1"/>
+        </dgm:pt>
+      </dgm:ptLst>
+      <dgm:cxnLst>
+        <dgm:cxn modelId="3" srcId="0" destId="1" srcOrd="0" destOrd="0"/>
+        <dgm:cxn modelId="4" srcId="0" destId="2" srcOrd="1" destOrd="0"/>
+      </dgm:cxnLst>
+      <dgm:bg/>
+      <dgm:whole/>
+    </dgm:dataModel>
+  </dgm:styleData>
+  <dgm:clrData>
+    <dgm:dataModel>
+      <dgm:ptLst>
+        <dgm:pt modelId="0" type="doc"/>
+        <dgm:pt modelId="1">
+          <dgm:prSet phldr="1"/>
+        </dgm:pt>
+        <dgm:pt modelId="2">
+          <dgm:prSet phldr="1"/>
+        </dgm:pt>
+        <dgm:pt modelId="3">
+          <dgm:prSet phldr="1"/>
+        </dgm:pt>
+        <dgm:pt modelId="4">
+          <dgm:prSet phldr="1"/>
+        </dgm:pt>
+      </dgm:ptLst>
+      <dgm:cxnLst>
+        <dgm:cxn modelId="5" srcId="0" destId="1" srcOrd="0" destOrd="0"/>
+        <dgm:cxn modelId="6" srcId="0" destId="2" srcOrd="1" destOrd="0"/>
+        <dgm:cxn modelId="7" srcId="0" destId="3" srcOrd="2" destOrd="0"/>
+        <dgm:cxn modelId="8" srcId="0" destId="4" srcOrd="3" destOrd="0"/>
+      </dgm:cxnLst>
+      <dgm:bg/>
+      <dgm:whole/>
+    </dgm:dataModel>
+  </dgm:clrData>
+  <dgm:layoutNode name="Name0">
+    <dgm:varLst>
+      <dgm:dir/>
+      <dgm:animLvl val="lvl"/>
+      <dgm:resizeHandles val="exact"/>
+    </dgm:varLst>
+    <dgm:choose name="Name1">
+      <dgm:if name="Name2" func="var" arg="dir" op="equ" val="norm">
+        <dgm:alg type="lin"/>
+      </dgm:if>
+      <dgm:else name="Name3">
+        <dgm:alg type="lin">
+          <dgm:param type="linDir" val="fromR"/>
+        </dgm:alg>
+      </dgm:else>
+    </dgm:choose>
+    <dgm:shape xmlns:r="http://schemas.openxmlformats.org/officeDocument/2006/relationships" r:blip="">
+      <dgm:adjLst/>
+    </dgm:shape>
+    <dgm:presOf/>
+    <dgm:constrLst>
+      <dgm:constr type="h" for="ch" forName="composite" refType="h"/>
+      <dgm:constr type="w" for="ch" forName="composite" refType="w"/>
+      <dgm:constr type="w" for="des" forName="parTx"/>
+      <dgm:constr type="h" for="des" forName="parTx" op="equ"/>
+      <dgm:constr type="w" for="des" forName="desTx"/>
+      <dgm:constr type="h" for="des" forName="desTx" op="equ"/>
+      <dgm:constr type="primFontSz" for="des" forName="parTx" val="65"/>
+      <dgm:constr type="secFontSz" for="des" forName="desTx" refType="primFontSz" refFor="des" refForName="parTx" op="equ"/>
+      <dgm:constr type="h" for="des" forName="parTx" refType="primFontSz" refFor="des" refForName="parTx" fact="0.8"/>
+      <dgm:constr type="h" for="des" forName="desTx" refType="primFontSz" refFor="des" refForName="parTx" fact="1.22"/>
+      <dgm:constr type="w" for="ch" forName="space" refType="w" refFor="ch" refForName="composite" op="equ" fact="0.14"/>
+    </dgm:constrLst>
+    <dgm:ruleLst>
+      <dgm:rule type="w" for="ch" forName="composite" val="0" fact="NaN" max="NaN"/>
+      <dgm:rule type="primFontSz" for="des" forName="parTx" val="5" fact="NaN" max="NaN"/>
+    </dgm:ruleLst>
+    <dgm:forEach name="Name4" axis="ch" ptType="node">
+      <dgm:layoutNode name="composite">
+        <dgm:alg type="composite"/>
+        <dgm:shape xmlns:r="http://schemas.openxmlformats.org/officeDocument/2006/relationships" r:blip="">
+          <dgm:adjLst/>
+        </dgm:shape>
+        <dgm:presOf/>
+        <dgm:constrLst>
+          <dgm:constr type="l" for="ch" forName="parTx"/>
+          <dgm:constr type="w" for="ch" forName="parTx" refType="w"/>
+          <dgm:constr type="t" for="ch" forName="parTx"/>
+          <dgm:constr type="l" for="ch" forName="desTx"/>
+          <dgm:constr type="w" for="ch" forName="desTx" refType="w" refFor="ch" refForName="parTx"/>
+          <dgm:constr type="t" for="ch" forName="desTx" refType="h" refFor="ch" refForName="parTx"/>
+        </dgm:constrLst>
+        <dgm:ruleLst>
+          <dgm:rule type="h" val="INF" fact="NaN" max="NaN"/>
+        </dgm:ruleLst>
+        <dgm:layoutNode name="parTx" styleLbl="alignNode1">
+          <dgm:varLst>
+            <dgm:chMax val="0"/>
+            <dgm:chPref val="0"/>
+            <dgm:bulletEnabled val="1"/>
+          </dgm:varLst>
+          <dgm:alg type="tx"/>
+          <dgm:shape xmlns:r="http://schemas.openxmlformats.org/officeDocument/2006/relationships" type="rect" r:blip="">
+            <dgm:adjLst/>
+          </dgm:shape>
+          <dgm:presOf axis="self" ptType="node"/>
+          <dgm:constrLst>
+            <dgm:constr type="h" refType="w" op="lte" fact="0.4"/>
+            <dgm:constr type="h"/>
+            <dgm:constr type="tMarg" refType="primFontSz" fact="0.32"/>
+            <dgm:constr type="bMarg" refType="primFontSz" fact="0.32"/>
+          </dgm:constrLst>
+          <dgm:ruleLst>
+            <dgm:rule type="h" val="INF" fact="NaN" max="NaN"/>
+          </dgm:ruleLst>
+        </dgm:layoutNode>
+        <dgm:layoutNode name="desTx" styleLbl="alignAccFollowNode1">
+          <dgm:varLst>
+            <dgm:bulletEnabled val="1"/>
+          </dgm:varLst>
+          <dgm:alg type="tx">
+            <dgm:param type="stBulletLvl" val="1"/>
+          </dgm:alg>
+          <dgm:shape xmlns:r="http://schemas.openxmlformats.org/officeDocument/2006/relationships" type="rect" r:blip="">
+            <dgm:adjLst/>
+          </dgm:shape>
+          <dgm:presOf axis="des" ptType="node"/>
+          <dgm:constrLst>
+            <dgm:constr type="secFontSz" val="65"/>
+            <dgm:constr type="primFontSz" refType="secFontSz"/>
+            <dgm:constr type="h"/>
+            <dgm:constr type="lMarg" refType="primFontSz" fact="0.42"/>
+            <dgm:constr type="tMarg" refType="primFontSz" fact="0.42"/>
+            <dgm:constr type="bMarg" refType="primFontSz" fact="0.63"/>
+          </dgm:constrLst>
+          <dgm:ruleLst>
+            <dgm:rule type="h" val="INF" fact="NaN" max="NaN"/>
+          </dgm:ruleLst>
+        </dgm:layoutNode>
+      </dgm:layoutNode>
+      <dgm:forEach name="Name5" axis="followSib" ptType="sibTrans" cnt="1">
+        <dgm:layoutNode name="space">
+          <dgm:alg type="sp"/>
+          <dgm:shape xmlns:r="http://schemas.openxmlformats.org/officeDocument/2006/relationships" r:blip="">
+            <dgm:adjLst/>
+          </dgm:shape>
+          <dgm:presOf/>
+          <dgm:constrLst/>
+          <dgm:ruleLst/>
+        </dgm:layoutNode>
+      </dgm:forEach>
+    </dgm:forEach>
+  </dgm:layoutNode>
+</dgm:layoutDef>
+</file>
+
 <file path=ppt/diagrams/quickStyle1.xml><?xml version="1.0" encoding="utf-8"?>
 <dgm:styleDef xmlns:dgm="http://schemas.openxmlformats.org/drawingml/2006/diagram" xmlns:a="http://schemas.openxmlformats.org/drawingml/2006/main" uniqueId="urn:microsoft.com/office/officeart/2005/8/quickstyle/simple1">
   <dgm:title val=""/>
@@ -4773,6 +6634,1040 @@
 </file>
 
 <file path=ppt/diagrams/quickStyle2.xml><?xml version="1.0" encoding="utf-8"?>
+<dgm:styleDef xmlns:dgm="http://schemas.openxmlformats.org/drawingml/2006/diagram" xmlns:a="http://schemas.openxmlformats.org/drawingml/2006/main" uniqueId="urn:microsoft.com/office/officeart/2005/8/quickstyle/simple1">
+  <dgm:title val=""/>
+  <dgm:desc val=""/>
+  <dgm:catLst>
+    <dgm:cat type="simple" pri="10100"/>
+  </dgm:catLst>
+  <dgm:scene3d>
+    <a:camera prst="orthographicFront"/>
+    <a:lightRig rig="threePt" dir="t"/>
+  </dgm:scene3d>
+  <dgm:styleLbl name="node0">
+    <dgm:scene3d>
+      <a:camera prst="orthographicFront"/>
+      <a:lightRig rig="threePt" dir="t"/>
+    </dgm:scene3d>
+    <dgm:sp3d/>
+    <dgm:txPr/>
+    <dgm:style>
+      <a:lnRef idx="2">
+        <a:scrgbClr r="0" g="0" b="0"/>
+      </a:lnRef>
+      <a:fillRef idx="1">
+        <a:scrgbClr r="0" g="0" b="0"/>
+      </a:fillRef>
+      <a:effectRef idx="0">
+        <a:scrgbClr r="0" g="0" b="0"/>
+      </a:effectRef>
+      <a:fontRef idx="minor">
+        <a:schemeClr val="lt1"/>
+      </a:fontRef>
+    </dgm:style>
+  </dgm:styleLbl>
+  <dgm:styleLbl name="lnNode1">
+    <dgm:scene3d>
+      <a:camera prst="orthographicFront"/>
+      <a:lightRig rig="threePt" dir="t"/>
+    </dgm:scene3d>
+    <dgm:sp3d/>
+    <dgm:txPr/>
+    <dgm:style>
+      <a:lnRef idx="2">
+        <a:scrgbClr r="0" g="0" b="0"/>
+      </a:lnRef>
+      <a:fillRef idx="1">
+        <a:scrgbClr r="0" g="0" b="0"/>
+      </a:fillRef>
+      <a:effectRef idx="0">
+        <a:scrgbClr r="0" g="0" b="0"/>
+      </a:effectRef>
+      <a:fontRef idx="minor">
+        <a:schemeClr val="lt1"/>
+      </a:fontRef>
+    </dgm:style>
+  </dgm:styleLbl>
+  <dgm:styleLbl name="vennNode1">
+    <dgm:scene3d>
+      <a:camera prst="orthographicFront"/>
+      <a:lightRig rig="threePt" dir="t"/>
+    </dgm:scene3d>
+    <dgm:sp3d/>
+    <dgm:txPr/>
+    <dgm:style>
+      <a:lnRef idx="2">
+        <a:scrgbClr r="0" g="0" b="0"/>
+      </a:lnRef>
+      <a:fillRef idx="1">
+        <a:scrgbClr r="0" g="0" b="0"/>
+      </a:fillRef>
+      <a:effectRef idx="0">
+        <a:scrgbClr r="0" g="0" b="0"/>
+      </a:effectRef>
+      <a:fontRef idx="minor">
+        <a:schemeClr val="tx1"/>
+      </a:fontRef>
+    </dgm:style>
+  </dgm:styleLbl>
+  <dgm:styleLbl name="alignNode1">
+    <dgm:scene3d>
+      <a:camera prst="orthographicFront"/>
+      <a:lightRig rig="threePt" dir="t"/>
+    </dgm:scene3d>
+    <dgm:sp3d/>
+    <dgm:txPr/>
+    <dgm:style>
+      <a:lnRef idx="2">
+        <a:scrgbClr r="0" g="0" b="0"/>
+      </a:lnRef>
+      <a:fillRef idx="1">
+        <a:scrgbClr r="0" g="0" b="0"/>
+      </a:fillRef>
+      <a:effectRef idx="0">
+        <a:scrgbClr r="0" g="0" b="0"/>
+      </a:effectRef>
+      <a:fontRef idx="minor">
+        <a:schemeClr val="lt1"/>
+      </a:fontRef>
+    </dgm:style>
+  </dgm:styleLbl>
+  <dgm:styleLbl name="node1">
+    <dgm:scene3d>
+      <a:camera prst="orthographicFront"/>
+      <a:lightRig rig="threePt" dir="t"/>
+    </dgm:scene3d>
+    <dgm:sp3d/>
+    <dgm:txPr/>
+    <dgm:style>
+      <a:lnRef idx="2">
+        <a:scrgbClr r="0" g="0" b="0"/>
+      </a:lnRef>
+      <a:fillRef idx="1">
+        <a:scrgbClr r="0" g="0" b="0"/>
+      </a:fillRef>
+      <a:effectRef idx="0">
+        <a:scrgbClr r="0" g="0" b="0"/>
+      </a:effectRef>
+      <a:fontRef idx="minor">
+        <a:schemeClr val="lt1"/>
+      </a:fontRef>
+    </dgm:style>
+  </dgm:styleLbl>
+  <dgm:styleLbl name="node2">
+    <dgm:scene3d>
+      <a:camera prst="orthographicFront"/>
+      <a:lightRig rig="threePt" dir="t"/>
+    </dgm:scene3d>
+    <dgm:sp3d/>
+    <dgm:txPr/>
+    <dgm:style>
+      <a:lnRef idx="2">
+        <a:scrgbClr r="0" g="0" b="0"/>
+      </a:lnRef>
+      <a:fillRef idx="1">
+        <a:scrgbClr r="0" g="0" b="0"/>
+      </a:fillRef>
+      <a:effectRef idx="0">
+        <a:scrgbClr r="0" g="0" b="0"/>
+      </a:effectRef>
+      <a:fontRef idx="minor">
+        <a:schemeClr val="lt1"/>
+      </a:fontRef>
+    </dgm:style>
+  </dgm:styleLbl>
+  <dgm:styleLbl name="node3">
+    <dgm:scene3d>
+      <a:camera prst="orthographicFront"/>
+      <a:lightRig rig="threePt" dir="t"/>
+    </dgm:scene3d>
+    <dgm:sp3d/>
+    <dgm:txPr/>
+    <dgm:style>
+      <a:lnRef idx="2">
+        <a:scrgbClr r="0" g="0" b="0"/>
+      </a:lnRef>
+      <a:fillRef idx="1">
+        <a:scrgbClr r="0" g="0" b="0"/>
+      </a:fillRef>
+      <a:effectRef idx="0">
+        <a:scrgbClr r="0" g="0" b="0"/>
+      </a:effectRef>
+      <a:fontRef idx="minor">
+        <a:schemeClr val="lt1"/>
+      </a:fontRef>
+    </dgm:style>
+  </dgm:styleLbl>
+  <dgm:styleLbl name="node4">
+    <dgm:scene3d>
+      <a:camera prst="orthographicFront"/>
+      <a:lightRig rig="threePt" dir="t"/>
+    </dgm:scene3d>
+    <dgm:sp3d/>
+    <dgm:txPr/>
+    <dgm:style>
+      <a:lnRef idx="2">
+        <a:scrgbClr r="0" g="0" b="0"/>
+      </a:lnRef>
+      <a:fillRef idx="1">
+        <a:scrgbClr r="0" g="0" b="0"/>
+      </a:fillRef>
+      <a:effectRef idx="0">
+        <a:scrgbClr r="0" g="0" b="0"/>
+      </a:effectRef>
+      <a:fontRef idx="minor">
+        <a:schemeClr val="lt1"/>
+      </a:fontRef>
+    </dgm:style>
+  </dgm:styleLbl>
+  <dgm:styleLbl name="fgImgPlace1">
+    <dgm:scene3d>
+      <a:camera prst="orthographicFront"/>
+      <a:lightRig rig="threePt" dir="t"/>
+    </dgm:scene3d>
+    <dgm:sp3d/>
+    <dgm:txPr/>
+    <dgm:style>
+      <a:lnRef idx="2">
+        <a:scrgbClr r="0" g="0" b="0"/>
+      </a:lnRef>
+      <a:fillRef idx="1">
+        <a:scrgbClr r="0" g="0" b="0"/>
+      </a:fillRef>
+      <a:effectRef idx="0">
+        <a:scrgbClr r="0" g="0" b="0"/>
+      </a:effectRef>
+      <a:fontRef idx="minor"/>
+    </dgm:style>
+  </dgm:styleLbl>
+  <dgm:styleLbl name="alignImgPlace1">
+    <dgm:scene3d>
+      <a:camera prst="orthographicFront"/>
+      <a:lightRig rig="threePt" dir="t"/>
+    </dgm:scene3d>
+    <dgm:sp3d/>
+    <dgm:txPr/>
+    <dgm:style>
+      <a:lnRef idx="2">
+        <a:scrgbClr r="0" g="0" b="0"/>
+      </a:lnRef>
+      <a:fillRef idx="1">
+        <a:scrgbClr r="0" g="0" b="0"/>
+      </a:fillRef>
+      <a:effectRef idx="0">
+        <a:scrgbClr r="0" g="0" b="0"/>
+      </a:effectRef>
+      <a:fontRef idx="minor"/>
+    </dgm:style>
+  </dgm:styleLbl>
+  <dgm:styleLbl name="bgImgPlace1">
+    <dgm:scene3d>
+      <a:camera prst="orthographicFront"/>
+      <a:lightRig rig="threePt" dir="t"/>
+    </dgm:scene3d>
+    <dgm:sp3d/>
+    <dgm:txPr/>
+    <dgm:style>
+      <a:lnRef idx="2">
+        <a:scrgbClr r="0" g="0" b="0"/>
+      </a:lnRef>
+      <a:fillRef idx="1">
+        <a:scrgbClr r="0" g="0" b="0"/>
+      </a:fillRef>
+      <a:effectRef idx="0">
+        <a:scrgbClr r="0" g="0" b="0"/>
+      </a:effectRef>
+      <a:fontRef idx="minor"/>
+    </dgm:style>
+  </dgm:styleLbl>
+  <dgm:styleLbl name="sibTrans2D1">
+    <dgm:scene3d>
+      <a:camera prst="orthographicFront"/>
+      <a:lightRig rig="threePt" dir="t"/>
+    </dgm:scene3d>
+    <dgm:sp3d/>
+    <dgm:txPr/>
+    <dgm:style>
+      <a:lnRef idx="0">
+        <a:scrgbClr r="0" g="0" b="0"/>
+      </a:lnRef>
+      <a:fillRef idx="1">
+        <a:scrgbClr r="0" g="0" b="0"/>
+      </a:fillRef>
+      <a:effectRef idx="0">
+        <a:scrgbClr r="0" g="0" b="0"/>
+      </a:effectRef>
+      <a:fontRef idx="minor">
+        <a:schemeClr val="lt1"/>
+      </a:fontRef>
+    </dgm:style>
+  </dgm:styleLbl>
+  <dgm:styleLbl name="fgSibTrans2D1">
+    <dgm:scene3d>
+      <a:camera prst="orthographicFront"/>
+      <a:lightRig rig="threePt" dir="t"/>
+    </dgm:scene3d>
+    <dgm:sp3d/>
+    <dgm:txPr/>
+    <dgm:style>
+      <a:lnRef idx="0">
+        <a:scrgbClr r="0" g="0" b="0"/>
+      </a:lnRef>
+      <a:fillRef idx="1">
+        <a:scrgbClr r="0" g="0" b="0"/>
+      </a:fillRef>
+      <a:effectRef idx="0">
+        <a:scrgbClr r="0" g="0" b="0"/>
+      </a:effectRef>
+      <a:fontRef idx="minor">
+        <a:schemeClr val="lt1"/>
+      </a:fontRef>
+    </dgm:style>
+  </dgm:styleLbl>
+  <dgm:styleLbl name="bgSibTrans2D1">
+    <dgm:scene3d>
+      <a:camera prst="orthographicFront"/>
+      <a:lightRig rig="threePt" dir="t"/>
+    </dgm:scene3d>
+    <dgm:sp3d/>
+    <dgm:txPr/>
+    <dgm:style>
+      <a:lnRef idx="0">
+        <a:scrgbClr r="0" g="0" b="0"/>
+      </a:lnRef>
+      <a:fillRef idx="1">
+        <a:scrgbClr r="0" g="0" b="0"/>
+      </a:fillRef>
+      <a:effectRef idx="0">
+        <a:scrgbClr r="0" g="0" b="0"/>
+      </a:effectRef>
+      <a:fontRef idx="minor">
+        <a:schemeClr val="lt1"/>
+      </a:fontRef>
+    </dgm:style>
+  </dgm:styleLbl>
+  <dgm:styleLbl name="sibTrans1D1">
+    <dgm:scene3d>
+      <a:camera prst="orthographicFront"/>
+      <a:lightRig rig="threePt" dir="t"/>
+    </dgm:scene3d>
+    <dgm:sp3d/>
+    <dgm:txPr/>
+    <dgm:style>
+      <a:lnRef idx="1">
+        <a:scrgbClr r="0" g="0" b="0"/>
+      </a:lnRef>
+      <a:fillRef idx="0">
+        <a:scrgbClr r="0" g="0" b="0"/>
+      </a:fillRef>
+      <a:effectRef idx="0">
+        <a:scrgbClr r="0" g="0" b="0"/>
+      </a:effectRef>
+      <a:fontRef idx="minor"/>
+    </dgm:style>
+  </dgm:styleLbl>
+  <dgm:styleLbl name="callout">
+    <dgm:scene3d>
+      <a:camera prst="orthographicFront"/>
+      <a:lightRig rig="threePt" dir="t"/>
+    </dgm:scene3d>
+    <dgm:sp3d/>
+    <dgm:txPr/>
+    <dgm:style>
+      <a:lnRef idx="2">
+        <a:scrgbClr r="0" g="0" b="0"/>
+      </a:lnRef>
+      <a:fillRef idx="1">
+        <a:scrgbClr r="0" g="0" b="0"/>
+      </a:fillRef>
+      <a:effectRef idx="0">
+        <a:scrgbClr r="0" g="0" b="0"/>
+      </a:effectRef>
+      <a:fontRef idx="minor"/>
+    </dgm:style>
+  </dgm:styleLbl>
+  <dgm:styleLbl name="asst0">
+    <dgm:scene3d>
+      <a:camera prst="orthographicFront"/>
+      <a:lightRig rig="threePt" dir="t"/>
+    </dgm:scene3d>
+    <dgm:sp3d/>
+    <dgm:txPr/>
+    <dgm:style>
+      <a:lnRef idx="2">
+        <a:scrgbClr r="0" g="0" b="0"/>
+      </a:lnRef>
+      <a:fillRef idx="1">
+        <a:scrgbClr r="0" g="0" b="0"/>
+      </a:fillRef>
+      <a:effectRef idx="0">
+        <a:scrgbClr r="0" g="0" b="0"/>
+      </a:effectRef>
+      <a:fontRef idx="minor">
+        <a:schemeClr val="lt1"/>
+      </a:fontRef>
+    </dgm:style>
+  </dgm:styleLbl>
+  <dgm:styleLbl name="asst1">
+    <dgm:scene3d>
+      <a:camera prst="orthographicFront"/>
+      <a:lightRig rig="threePt" dir="t"/>
+    </dgm:scene3d>
+    <dgm:sp3d/>
+    <dgm:txPr/>
+    <dgm:style>
+      <a:lnRef idx="2">
+        <a:scrgbClr r="0" g="0" b="0"/>
+      </a:lnRef>
+      <a:fillRef idx="1">
+        <a:scrgbClr r="0" g="0" b="0"/>
+      </a:fillRef>
+      <a:effectRef idx="0">
+        <a:scrgbClr r="0" g="0" b="0"/>
+      </a:effectRef>
+      <a:fontRef idx="minor">
+        <a:schemeClr val="lt1"/>
+      </a:fontRef>
+    </dgm:style>
+  </dgm:styleLbl>
+  <dgm:styleLbl name="asst2">
+    <dgm:scene3d>
+      <a:camera prst="orthographicFront"/>
+      <a:lightRig rig="threePt" dir="t"/>
+    </dgm:scene3d>
+    <dgm:sp3d/>
+    <dgm:txPr/>
+    <dgm:style>
+      <a:lnRef idx="2">
+        <a:scrgbClr r="0" g="0" b="0"/>
+      </a:lnRef>
+      <a:fillRef idx="1">
+        <a:scrgbClr r="0" g="0" b="0"/>
+      </a:fillRef>
+      <a:effectRef idx="0">
+        <a:scrgbClr r="0" g="0" b="0"/>
+      </a:effectRef>
+      <a:fontRef idx="minor">
+        <a:schemeClr val="lt1"/>
+      </a:fontRef>
+    </dgm:style>
+  </dgm:styleLbl>
+  <dgm:styleLbl name="asst3">
+    <dgm:scene3d>
+      <a:camera prst="orthographicFront"/>
+      <a:lightRig rig="threePt" dir="t"/>
+    </dgm:scene3d>
+    <dgm:sp3d/>
+    <dgm:txPr/>
+    <dgm:style>
+      <a:lnRef idx="2">
+        <a:scrgbClr r="0" g="0" b="0"/>
+      </a:lnRef>
+      <a:fillRef idx="1">
+        <a:scrgbClr r="0" g="0" b="0"/>
+      </a:fillRef>
+      <a:effectRef idx="0">
+        <a:scrgbClr r="0" g="0" b="0"/>
+      </a:effectRef>
+      <a:fontRef idx="minor">
+        <a:schemeClr val="lt1"/>
+      </a:fontRef>
+    </dgm:style>
+  </dgm:styleLbl>
+  <dgm:styleLbl name="asst4">
+    <dgm:scene3d>
+      <a:camera prst="orthographicFront"/>
+      <a:lightRig rig="threePt" dir="t"/>
+    </dgm:scene3d>
+    <dgm:sp3d/>
+    <dgm:txPr/>
+    <dgm:style>
+      <a:lnRef idx="2">
+        <a:scrgbClr r="0" g="0" b="0"/>
+      </a:lnRef>
+      <a:fillRef idx="1">
+        <a:scrgbClr r="0" g="0" b="0"/>
+      </a:fillRef>
+      <a:effectRef idx="0">
+        <a:scrgbClr r="0" g="0" b="0"/>
+      </a:effectRef>
+      <a:fontRef idx="minor">
+        <a:schemeClr val="lt1"/>
+      </a:fontRef>
+    </dgm:style>
+  </dgm:styleLbl>
+  <dgm:styleLbl name="parChTrans2D1">
+    <dgm:scene3d>
+      <a:camera prst="orthographicFront"/>
+      <a:lightRig rig="threePt" dir="t"/>
+    </dgm:scene3d>
+    <dgm:sp3d/>
+    <dgm:txPr/>
+    <dgm:style>
+      <a:lnRef idx="2">
+        <a:scrgbClr r="0" g="0" b="0"/>
+      </a:lnRef>
+      <a:fillRef idx="1">
+        <a:scrgbClr r="0" g="0" b="0"/>
+      </a:fillRef>
+      <a:effectRef idx="0">
+        <a:scrgbClr r="0" g="0" b="0"/>
+      </a:effectRef>
+      <a:fontRef idx="minor">
+        <a:schemeClr val="lt1"/>
+      </a:fontRef>
+    </dgm:style>
+  </dgm:styleLbl>
+  <dgm:styleLbl name="parChTrans2D2">
+    <dgm:scene3d>
+      <a:camera prst="orthographicFront"/>
+      <a:lightRig rig="threePt" dir="t"/>
+    </dgm:scene3d>
+    <dgm:sp3d/>
+    <dgm:txPr/>
+    <dgm:style>
+      <a:lnRef idx="2">
+        <a:scrgbClr r="0" g="0" b="0"/>
+      </a:lnRef>
+      <a:fillRef idx="1">
+        <a:scrgbClr r="0" g="0" b="0"/>
+      </a:fillRef>
+      <a:effectRef idx="0">
+        <a:scrgbClr r="0" g="0" b="0"/>
+      </a:effectRef>
+      <a:fontRef idx="minor">
+        <a:schemeClr val="lt1"/>
+      </a:fontRef>
+    </dgm:style>
+  </dgm:styleLbl>
+  <dgm:styleLbl name="parChTrans2D3">
+    <dgm:scene3d>
+      <a:camera prst="orthographicFront"/>
+      <a:lightRig rig="threePt" dir="t"/>
+    </dgm:scene3d>
+    <dgm:sp3d/>
+    <dgm:txPr/>
+    <dgm:style>
+      <a:lnRef idx="2">
+        <a:scrgbClr r="0" g="0" b="0"/>
+      </a:lnRef>
+      <a:fillRef idx="1">
+        <a:scrgbClr r="0" g="0" b="0"/>
+      </a:fillRef>
+      <a:effectRef idx="0">
+        <a:scrgbClr r="0" g="0" b="0"/>
+      </a:effectRef>
+      <a:fontRef idx="minor">
+        <a:schemeClr val="lt1"/>
+      </a:fontRef>
+    </dgm:style>
+  </dgm:styleLbl>
+  <dgm:styleLbl name="parChTrans2D4">
+    <dgm:scene3d>
+      <a:camera prst="orthographicFront"/>
+      <a:lightRig rig="threePt" dir="t"/>
+    </dgm:scene3d>
+    <dgm:sp3d/>
+    <dgm:txPr/>
+    <dgm:style>
+      <a:lnRef idx="2">
+        <a:scrgbClr r="0" g="0" b="0"/>
+      </a:lnRef>
+      <a:fillRef idx="1">
+        <a:scrgbClr r="0" g="0" b="0"/>
+      </a:fillRef>
+      <a:effectRef idx="0">
+        <a:scrgbClr r="0" g="0" b="0"/>
+      </a:effectRef>
+      <a:fontRef idx="minor">
+        <a:schemeClr val="lt1"/>
+      </a:fontRef>
+    </dgm:style>
+  </dgm:styleLbl>
+  <dgm:styleLbl name="parChTrans1D1">
+    <dgm:scene3d>
+      <a:camera prst="orthographicFront"/>
+      <a:lightRig rig="threePt" dir="t"/>
+    </dgm:scene3d>
+    <dgm:sp3d/>
+    <dgm:txPr/>
+    <dgm:style>
+      <a:lnRef idx="2">
+        <a:scrgbClr r="0" g="0" b="0"/>
+      </a:lnRef>
+      <a:fillRef idx="0">
+        <a:scrgbClr r="0" g="0" b="0"/>
+      </a:fillRef>
+      <a:effectRef idx="0">
+        <a:scrgbClr r="0" g="0" b="0"/>
+      </a:effectRef>
+      <a:fontRef idx="minor"/>
+    </dgm:style>
+  </dgm:styleLbl>
+  <dgm:styleLbl name="parChTrans1D2">
+    <dgm:scene3d>
+      <a:camera prst="orthographicFront"/>
+      <a:lightRig rig="threePt" dir="t"/>
+    </dgm:scene3d>
+    <dgm:sp3d/>
+    <dgm:txPr/>
+    <dgm:style>
+      <a:lnRef idx="2">
+        <a:scrgbClr r="0" g="0" b="0"/>
+      </a:lnRef>
+      <a:fillRef idx="0">
+        <a:scrgbClr r="0" g="0" b="0"/>
+      </a:fillRef>
+      <a:effectRef idx="0">
+        <a:scrgbClr r="0" g="0" b="0"/>
+      </a:effectRef>
+      <a:fontRef idx="minor"/>
+    </dgm:style>
+  </dgm:styleLbl>
+  <dgm:styleLbl name="parChTrans1D3">
+    <dgm:scene3d>
+      <a:camera prst="orthographicFront"/>
+      <a:lightRig rig="threePt" dir="t"/>
+    </dgm:scene3d>
+    <dgm:sp3d/>
+    <dgm:txPr/>
+    <dgm:style>
+      <a:lnRef idx="2">
+        <a:scrgbClr r="0" g="0" b="0"/>
+      </a:lnRef>
+      <a:fillRef idx="0">
+        <a:scrgbClr r="0" g="0" b="0"/>
+      </a:fillRef>
+      <a:effectRef idx="0">
+        <a:scrgbClr r="0" g="0" b="0"/>
+      </a:effectRef>
+      <a:fontRef idx="minor"/>
+    </dgm:style>
+  </dgm:styleLbl>
+  <dgm:styleLbl name="parChTrans1D4">
+    <dgm:scene3d>
+      <a:camera prst="orthographicFront"/>
+      <a:lightRig rig="threePt" dir="t"/>
+    </dgm:scene3d>
+    <dgm:sp3d/>
+    <dgm:txPr/>
+    <dgm:style>
+      <a:lnRef idx="2">
+        <a:scrgbClr r="0" g="0" b="0"/>
+      </a:lnRef>
+      <a:fillRef idx="0">
+        <a:scrgbClr r="0" g="0" b="0"/>
+      </a:fillRef>
+      <a:effectRef idx="0">
+        <a:scrgbClr r="0" g="0" b="0"/>
+      </a:effectRef>
+      <a:fontRef idx="minor"/>
+    </dgm:style>
+  </dgm:styleLbl>
+  <dgm:styleLbl name="fgAcc1">
+    <dgm:scene3d>
+      <a:camera prst="orthographicFront"/>
+      <a:lightRig rig="threePt" dir="t"/>
+    </dgm:scene3d>
+    <dgm:sp3d/>
+    <dgm:txPr/>
+    <dgm:style>
+      <a:lnRef idx="2">
+        <a:scrgbClr r="0" g="0" b="0"/>
+      </a:lnRef>
+      <a:fillRef idx="1">
+        <a:scrgbClr r="0" g="0" b="0"/>
+      </a:fillRef>
+      <a:effectRef idx="0">
+        <a:scrgbClr r="0" g="0" b="0"/>
+      </a:effectRef>
+      <a:fontRef idx="minor"/>
+    </dgm:style>
+  </dgm:styleLbl>
+  <dgm:styleLbl name="conFgAcc1">
+    <dgm:scene3d>
+      <a:camera prst="orthographicFront"/>
+      <a:lightRig rig="threePt" dir="t"/>
+    </dgm:scene3d>
+    <dgm:sp3d/>
+    <dgm:txPr/>
+    <dgm:style>
+      <a:lnRef idx="2">
+        <a:scrgbClr r="0" g="0" b="0"/>
+      </a:lnRef>
+      <a:fillRef idx="1">
+        <a:scrgbClr r="0" g="0" b="0"/>
+      </a:fillRef>
+      <a:effectRef idx="0">
+        <a:scrgbClr r="0" g="0" b="0"/>
+      </a:effectRef>
+      <a:fontRef idx="minor"/>
+    </dgm:style>
+  </dgm:styleLbl>
+  <dgm:styleLbl name="alignAcc1">
+    <dgm:scene3d>
+      <a:camera prst="orthographicFront"/>
+      <a:lightRig rig="threePt" dir="t"/>
+    </dgm:scene3d>
+    <dgm:sp3d/>
+    <dgm:txPr/>
+    <dgm:style>
+      <a:lnRef idx="2">
+        <a:scrgbClr r="0" g="0" b="0"/>
+      </a:lnRef>
+      <a:fillRef idx="1">
+        <a:scrgbClr r="0" g="0" b="0"/>
+      </a:fillRef>
+      <a:effectRef idx="0">
+        <a:scrgbClr r="0" g="0" b="0"/>
+      </a:effectRef>
+      <a:fontRef idx="minor"/>
+    </dgm:style>
+  </dgm:styleLbl>
+  <dgm:styleLbl name="trAlignAcc1">
+    <dgm:scene3d>
+      <a:camera prst="orthographicFront"/>
+      <a:lightRig rig="threePt" dir="t"/>
+    </dgm:scene3d>
+    <dgm:sp3d/>
+    <dgm:txPr/>
+    <dgm:style>
+      <a:lnRef idx="1">
+        <a:scrgbClr r="0" g="0" b="0"/>
+      </a:lnRef>
+      <a:fillRef idx="1">
+        <a:scrgbClr r="0" g="0" b="0"/>
+      </a:fillRef>
+      <a:effectRef idx="0">
+        <a:scrgbClr r="0" g="0" b="0"/>
+      </a:effectRef>
+      <a:fontRef idx="minor"/>
+    </dgm:style>
+  </dgm:styleLbl>
+  <dgm:styleLbl name="bgAcc1">
+    <dgm:scene3d>
+      <a:camera prst="orthographicFront"/>
+      <a:lightRig rig="threePt" dir="t"/>
+    </dgm:scene3d>
+    <dgm:sp3d/>
+    <dgm:txPr/>
+    <dgm:style>
+      <a:lnRef idx="2">
+        <a:scrgbClr r="0" g="0" b="0"/>
+      </a:lnRef>
+      <a:fillRef idx="1">
+        <a:scrgbClr r="0" g="0" b="0"/>
+      </a:fillRef>
+      <a:effectRef idx="0">
+        <a:scrgbClr r="0" g="0" b="0"/>
+      </a:effectRef>
+      <a:fontRef idx="minor"/>
+    </dgm:style>
+  </dgm:styleLbl>
+  <dgm:styleLbl name="solidFgAcc1">
+    <dgm:scene3d>
+      <a:camera prst="orthographicFront"/>
+      <a:lightRig rig="threePt" dir="t"/>
+    </dgm:scene3d>
+    <dgm:sp3d/>
+    <dgm:txPr/>
+    <dgm:style>
+      <a:lnRef idx="2">
+        <a:scrgbClr r="0" g="0" b="0"/>
+      </a:lnRef>
+      <a:fillRef idx="1">
+        <a:scrgbClr r="0" g="0" b="0"/>
+      </a:fillRef>
+      <a:effectRef idx="0">
+        <a:scrgbClr r="0" g="0" b="0"/>
+      </a:effectRef>
+      <a:fontRef idx="minor"/>
+    </dgm:style>
+  </dgm:styleLbl>
+  <dgm:styleLbl name="solidAlignAcc1">
+    <dgm:scene3d>
+      <a:camera prst="orthographicFront"/>
+      <a:lightRig rig="threePt" dir="t"/>
+    </dgm:scene3d>
+    <dgm:sp3d/>
+    <dgm:txPr/>
+    <dgm:style>
+      <a:lnRef idx="2">
+        <a:scrgbClr r="0" g="0" b="0"/>
+      </a:lnRef>
+      <a:fillRef idx="1">
+        <a:scrgbClr r="0" g="0" b="0"/>
+      </a:fillRef>
+      <a:effectRef idx="0">
+        <a:scrgbClr r="0" g="0" b="0"/>
+      </a:effectRef>
+      <a:fontRef idx="minor"/>
+    </dgm:style>
+  </dgm:styleLbl>
+  <dgm:styleLbl name="solidBgAcc1">
+    <dgm:scene3d>
+      <a:camera prst="orthographicFront"/>
+      <a:lightRig rig="threePt" dir="t"/>
+    </dgm:scene3d>
+    <dgm:sp3d/>
+    <dgm:txPr/>
+    <dgm:style>
+      <a:lnRef idx="2">
+        <a:scrgbClr r="0" g="0" b="0"/>
+      </a:lnRef>
+      <a:fillRef idx="1">
+        <a:scrgbClr r="0" g="0" b="0"/>
+      </a:fillRef>
+      <a:effectRef idx="0">
+        <a:scrgbClr r="0" g="0" b="0"/>
+      </a:effectRef>
+      <a:fontRef idx="minor"/>
+    </dgm:style>
+  </dgm:styleLbl>
+  <dgm:styleLbl name="fgAccFollowNode1">
+    <dgm:scene3d>
+      <a:camera prst="orthographicFront"/>
+      <a:lightRig rig="threePt" dir="t"/>
+    </dgm:scene3d>
+    <dgm:sp3d/>
+    <dgm:txPr/>
+    <dgm:style>
+      <a:lnRef idx="2">
+        <a:scrgbClr r="0" g="0" b="0"/>
+      </a:lnRef>
+      <a:fillRef idx="1">
+        <a:scrgbClr r="0" g="0" b="0"/>
+      </a:fillRef>
+      <a:effectRef idx="0">
+        <a:scrgbClr r="0" g="0" b="0"/>
+      </a:effectRef>
+      <a:fontRef idx="minor"/>
+    </dgm:style>
+  </dgm:styleLbl>
+  <dgm:styleLbl name="alignAccFollowNode1">
+    <dgm:scene3d>
+      <a:camera prst="orthographicFront"/>
+      <a:lightRig rig="threePt" dir="t"/>
+    </dgm:scene3d>
+    <dgm:sp3d/>
+    <dgm:txPr/>
+    <dgm:style>
+      <a:lnRef idx="2">
+        <a:scrgbClr r="0" g="0" b="0"/>
+      </a:lnRef>
+      <a:fillRef idx="1">
+        <a:scrgbClr r="0" g="0" b="0"/>
+      </a:fillRef>
+      <a:effectRef idx="0">
+        <a:scrgbClr r="0" g="0" b="0"/>
+      </a:effectRef>
+      <a:fontRef idx="minor"/>
+    </dgm:style>
+  </dgm:styleLbl>
+  <dgm:styleLbl name="bgAccFollowNode1">
+    <dgm:scene3d>
+      <a:camera prst="orthographicFront"/>
+      <a:lightRig rig="threePt" dir="t"/>
+    </dgm:scene3d>
+    <dgm:sp3d/>
+    <dgm:txPr/>
+    <dgm:style>
+      <a:lnRef idx="2">
+        <a:scrgbClr r="0" g="0" b="0"/>
+      </a:lnRef>
+      <a:fillRef idx="1">
+        <a:scrgbClr r="0" g="0" b="0"/>
+      </a:fillRef>
+      <a:effectRef idx="0">
+        <a:scrgbClr r="0" g="0" b="0"/>
+      </a:effectRef>
+      <a:fontRef idx="minor"/>
+    </dgm:style>
+  </dgm:styleLbl>
+  <dgm:styleLbl name="fgAcc0">
+    <dgm:scene3d>
+      <a:camera prst="orthographicFront"/>
+      <a:lightRig rig="threePt" dir="t"/>
+    </dgm:scene3d>
+    <dgm:sp3d/>
+    <dgm:txPr/>
+    <dgm:style>
+      <a:lnRef idx="2">
+        <a:scrgbClr r="0" g="0" b="0"/>
+      </a:lnRef>
+      <a:fillRef idx="1">
+        <a:scrgbClr r="0" g="0" b="0"/>
+      </a:fillRef>
+      <a:effectRef idx="0">
+        <a:scrgbClr r="0" g="0" b="0"/>
+      </a:effectRef>
+      <a:fontRef idx="minor"/>
+    </dgm:style>
+  </dgm:styleLbl>
+  <dgm:styleLbl name="fgAcc2">
+    <dgm:scene3d>
+      <a:camera prst="orthographicFront"/>
+      <a:lightRig rig="threePt" dir="t"/>
+    </dgm:scene3d>
+    <dgm:sp3d/>
+    <dgm:txPr/>
+    <dgm:style>
+      <a:lnRef idx="2">
+        <a:scrgbClr r="0" g="0" b="0"/>
+      </a:lnRef>
+      <a:fillRef idx="1">
+        <a:scrgbClr r="0" g="0" b="0"/>
+      </a:fillRef>
+      <a:effectRef idx="0">
+        <a:scrgbClr r="0" g="0" b="0"/>
+      </a:effectRef>
+      <a:fontRef idx="minor"/>
+    </dgm:style>
+  </dgm:styleLbl>
+  <dgm:styleLbl name="fgAcc3">
+    <dgm:scene3d>
+      <a:camera prst="orthographicFront"/>
+      <a:lightRig rig="threePt" dir="t"/>
+    </dgm:scene3d>
+    <dgm:sp3d/>
+    <dgm:txPr/>
+    <dgm:style>
+      <a:lnRef idx="2">
+        <a:scrgbClr r="0" g="0" b="0"/>
+      </a:lnRef>
+      <a:fillRef idx="1">
+        <a:scrgbClr r="0" g="0" b="0"/>
+      </a:fillRef>
+      <a:effectRef idx="0">
+        <a:scrgbClr r="0" g="0" b="0"/>
+      </a:effectRef>
+      <a:fontRef idx="minor"/>
+    </dgm:style>
+  </dgm:styleLbl>
+  <dgm:styleLbl name="fgAcc4">
+    <dgm:scene3d>
+      <a:camera prst="orthographicFront"/>
+      <a:lightRig rig="threePt" dir="t"/>
+    </dgm:scene3d>
+    <dgm:sp3d/>
+    <dgm:txPr/>
+    <dgm:style>
+      <a:lnRef idx="2">
+        <a:scrgbClr r="0" g="0" b="0"/>
+      </a:lnRef>
+      <a:fillRef idx="1">
+        <a:scrgbClr r="0" g="0" b="0"/>
+      </a:fillRef>
+      <a:effectRef idx="0">
+        <a:scrgbClr r="0" g="0" b="0"/>
+      </a:effectRef>
+      <a:fontRef idx="minor"/>
+    </dgm:style>
+  </dgm:styleLbl>
+  <dgm:styleLbl name="bgShp">
+    <dgm:scene3d>
+      <a:camera prst="orthographicFront"/>
+      <a:lightRig rig="threePt" dir="t"/>
+    </dgm:scene3d>
+    <dgm:sp3d/>
+    <dgm:txPr/>
+    <dgm:style>
+      <a:lnRef idx="0">
+        <a:scrgbClr r="0" g="0" b="0"/>
+      </a:lnRef>
+      <a:fillRef idx="1">
+        <a:scrgbClr r="0" g="0" b="0"/>
+      </a:fillRef>
+      <a:effectRef idx="0">
+        <a:scrgbClr r="0" g="0" b="0"/>
+      </a:effectRef>
+      <a:fontRef idx="minor"/>
+    </dgm:style>
+  </dgm:styleLbl>
+  <dgm:styleLbl name="dkBgShp">
+    <dgm:scene3d>
+      <a:camera prst="orthographicFront"/>
+      <a:lightRig rig="threePt" dir="t"/>
+    </dgm:scene3d>
+    <dgm:sp3d/>
+    <dgm:txPr/>
+    <dgm:style>
+      <a:lnRef idx="0">
+        <a:scrgbClr r="0" g="0" b="0"/>
+      </a:lnRef>
+      <a:fillRef idx="1">
+        <a:scrgbClr r="0" g="0" b="0"/>
+      </a:fillRef>
+      <a:effectRef idx="0">
+        <a:scrgbClr r="0" g="0" b="0"/>
+      </a:effectRef>
+      <a:fontRef idx="minor"/>
+    </dgm:style>
+  </dgm:styleLbl>
+  <dgm:styleLbl name="trBgShp">
+    <dgm:scene3d>
+      <a:camera prst="orthographicFront"/>
+      <a:lightRig rig="threePt" dir="t"/>
+    </dgm:scene3d>
+    <dgm:sp3d/>
+    <dgm:txPr/>
+    <dgm:style>
+      <a:lnRef idx="0">
+        <a:scrgbClr r="0" g="0" b="0"/>
+      </a:lnRef>
+      <a:fillRef idx="1">
+        <a:scrgbClr r="0" g="0" b="0"/>
+      </a:fillRef>
+      <a:effectRef idx="0">
+        <a:scrgbClr r="0" g="0" b="0"/>
+      </a:effectRef>
+      <a:fontRef idx="minor"/>
+    </dgm:style>
+  </dgm:styleLbl>
+  <dgm:styleLbl name="fgShp">
+    <dgm:scene3d>
+      <a:camera prst="orthographicFront"/>
+      <a:lightRig rig="threePt" dir="t"/>
+    </dgm:scene3d>
+    <dgm:sp3d/>
+    <dgm:txPr/>
+    <dgm:style>
+      <a:lnRef idx="2">
+        <a:scrgbClr r="0" g="0" b="0"/>
+      </a:lnRef>
+      <a:fillRef idx="1">
+        <a:scrgbClr r="0" g="0" b="0"/>
+      </a:fillRef>
+      <a:effectRef idx="0">
+        <a:scrgbClr r="0" g="0" b="0"/>
+      </a:effectRef>
+      <a:fontRef idx="minor"/>
+    </dgm:style>
+  </dgm:styleLbl>
+  <dgm:styleLbl name="revTx">
+    <dgm:scene3d>
+      <a:camera prst="orthographicFront"/>
+      <a:lightRig rig="threePt" dir="t"/>
+    </dgm:scene3d>
+    <dgm:sp3d/>
+    <dgm:txPr/>
+    <dgm:style>
+      <a:lnRef idx="0">
+        <a:scrgbClr r="0" g="0" b="0"/>
+      </a:lnRef>
+      <a:fillRef idx="0">
+        <a:scrgbClr r="0" g="0" b="0"/>
+      </a:fillRef>
+      <a:effectRef idx="0">
+        <a:scrgbClr r="0" g="0" b="0"/>
+      </a:effectRef>
+      <a:fontRef idx="minor"/>
+    </dgm:style>
+  </dgm:styleLbl>
+</dgm:styleDef>
+</file>
+
+<file path=ppt/diagrams/quickStyle3.xml><?xml version="1.0" encoding="utf-8"?>
 <dgm:styleDef xmlns:dgm="http://schemas.openxmlformats.org/drawingml/2006/diagram" xmlns:a="http://schemas.openxmlformats.org/drawingml/2006/main" uniqueId="urn:microsoft.com/office/officeart/2005/8/quickstyle/simple1">
   <dgm:title val=""/>
   <dgm:desc val=""/>
@@ -11791,12 +14686,20 @@
 <file path=ppt/slides/slide8.xml><?xml version="1.0" encoding="utf-8"?>
 <p:sld xmlns:a="http://schemas.openxmlformats.org/drawingml/2006/main" xmlns:r="http://schemas.openxmlformats.org/officeDocument/2006/relationships" xmlns:p="http://schemas.openxmlformats.org/presentationml/2006/main">
   <p:cSld>
+    <p:bg>
+      <p:bgPr>
+        <a:solidFill>
+          <a:schemeClr val="bg1"/>
+        </a:solidFill>
+        <a:effectLst/>
+      </p:bgPr>
+    </p:bg>
     <p:spTree>
       <p:nvGrpSpPr>
         <p:cNvPr id="1" name="">
           <a:extLst>
             <a:ext uri="{FF2B5EF4-FFF2-40B4-BE49-F238E27FC236}">
-              <a16:creationId xmlns:a16="http://schemas.microsoft.com/office/drawing/2014/main" id="{0D1E3610-2893-6522-0B32-1862CB5D157F}"/>
+              <a16:creationId xmlns:a16="http://schemas.microsoft.com/office/drawing/2014/main" id="{A678BBE8-3E51-47B6-ECEB-3F6B22EF92B1}"/>
             </a:ext>
           </a:extLst>
         </p:cNvPr>
@@ -11811,26 +14714,29 @@
           <a:chExt cx="0" cy="0"/>
         </a:xfrm>
       </p:grpSpPr>
-      <p:pic>
-        <p:nvPicPr>
-          <p:cNvPr id="3" name="Picture 2">
+      <p:sp useBgFill="1">
+        <p:nvSpPr>
+          <p:cNvPr id="15" name="Rectangle 14">
             <a:extLst>
               <a:ext uri="{FF2B5EF4-FFF2-40B4-BE49-F238E27FC236}">
-                <a16:creationId xmlns:a16="http://schemas.microsoft.com/office/drawing/2014/main" id="{27517069-93AC-726E-AC59-B55C3E33906F}"/>
+                <a16:creationId xmlns:a16="http://schemas.microsoft.com/office/drawing/2014/main" id="{33FC4FA9-EB6D-9895-5DD9-C7AC2B7307D5}"/>
+              </a:ext>
+              <a:ext uri="{C183D7F6-B498-43B3-948B-1728B52AA6E4}">
+                <adec:decorative xmlns:adec="http://schemas.microsoft.com/office/drawing/2017/decorative" val="1"/>
               </a:ext>
             </a:extLst>
           </p:cNvPr>
-          <p:cNvPicPr>
-            <a:picLocks noChangeAspect="1"/>
-          </p:cNvPicPr>
-          <p:nvPr/>
-        </p:nvPicPr>
-        <p:blipFill>
-          <a:blip r:embed="rId2"/>
-          <a:stretch>
-            <a:fillRect/>
-          </a:stretch>
-        </p:blipFill>
+          <p:cNvSpPr>
+            <a:spLocks noGrp="1" noRot="1" noChangeAspect="1" noMove="1" noResize="1" noEditPoints="1" noAdjustHandles="1" noChangeArrowheads="1" noChangeShapeType="1" noTextEdit="1"/>
+          </p:cNvSpPr>
+          <p:nvPr>
+            <p:extLst>
+              <p:ext uri="{386F3935-93C4-4BCD-93E2-E3B085C9AB24}">
+                <p16:designElem xmlns:p16="http://schemas.microsoft.com/office/powerpoint/2015/main" val="1"/>
+              </p:ext>
+            </p:extLst>
+          </p:nvPr>
+        </p:nvSpPr>
         <p:spPr>
           <a:xfrm>
             <a:off x="0" y="0"/>
@@ -11839,12 +14745,1061 @@
           <a:prstGeom prst="rect">
             <a:avLst/>
           </a:prstGeom>
+          <a:ln w="12700" cap="flat" cmpd="sng" algn="ctr">
+            <a:noFill/>
+            <a:prstDash val="solid"/>
+            <a:miter lim="800000"/>
+          </a:ln>
+          <a:effectLst/>
+          <a:extLst>
+            <a:ext uri="{91240B29-F687-4F45-9708-019B960494DF}">
+              <a14:hiddenLine xmlns:a14="http://schemas.microsoft.com/office/drawing/2010/main" w="12700" cap="flat" cmpd="sng" algn="ctr">
+                <a:solidFill>
+                  <a:schemeClr val="accent1">
+                    <a:shade val="50000"/>
+                  </a:schemeClr>
+                </a:solidFill>
+                <a:prstDash val="solid"/>
+                <a:miter lim="800000"/>
+              </a14:hiddenLine>
+            </a:ext>
+          </a:extLst>
         </p:spPr>
-      </p:pic>
+        <p:style>
+          <a:lnRef idx="2">
+            <a:schemeClr val="accent1">
+              <a:shade val="50000"/>
+            </a:schemeClr>
+          </a:lnRef>
+          <a:fillRef idx="1">
+            <a:schemeClr val="accent1"/>
+          </a:fillRef>
+          <a:effectRef idx="0">
+            <a:schemeClr val="accent1"/>
+          </a:effectRef>
+          <a:fontRef idx="minor">
+            <a:schemeClr val="lt1"/>
+          </a:fontRef>
+        </p:style>
+        <p:txBody>
+          <a:bodyPr rtlCol="0" anchor="ctr"/>
+          <a:lstStyle/>
+          <a:p>
+            <a:pPr algn="ctr"/>
+            <a:endParaRPr lang="en-US"/>
+          </a:p>
+        </p:txBody>
+      </p:sp>
+      <p:sp>
+        <p:nvSpPr>
+          <p:cNvPr id="13" name="Rectangle: Rounded Corners 12">
+            <a:extLst>
+              <a:ext uri="{FF2B5EF4-FFF2-40B4-BE49-F238E27FC236}">
+                <a16:creationId xmlns:a16="http://schemas.microsoft.com/office/drawing/2014/main" id="{03C45EB5-2B43-556E-23D7-6DCDE0BE09BA}"/>
+              </a:ext>
+            </a:extLst>
+          </p:cNvPr>
+          <p:cNvSpPr/>
+          <p:nvPr/>
+        </p:nvSpPr>
+        <p:spPr>
+          <a:xfrm>
+            <a:off x="1155700" y="1790700"/>
+            <a:ext cx="9271000" cy="4772762"/>
+          </a:xfrm>
+          <a:prstGeom prst="roundRect">
+            <a:avLst/>
+          </a:prstGeom>
+        </p:spPr>
+        <p:style>
+          <a:lnRef idx="2">
+            <a:schemeClr val="accent1"/>
+          </a:lnRef>
+          <a:fillRef idx="1">
+            <a:schemeClr val="lt1"/>
+          </a:fillRef>
+          <a:effectRef idx="0">
+            <a:schemeClr val="accent1"/>
+          </a:effectRef>
+          <a:fontRef idx="minor">
+            <a:schemeClr val="dk1"/>
+          </a:fontRef>
+        </p:style>
+        <p:txBody>
+          <a:bodyPr rtlCol="0" anchor="ctr"/>
+          <a:lstStyle/>
+          <a:p>
+            <a:pPr algn="ctr"/>
+            <a:r>
+              <a:rPr lang="en-GB" sz="3200" b="1" dirty="0"/>
+              <a:t>Flask Webserver</a:t>
+            </a:r>
+          </a:p>
+          <a:p>
+            <a:pPr algn="ctr"/>
+            <a:endParaRPr lang="en-GB" b="1" dirty="0"/>
+          </a:p>
+          <a:p>
+            <a:pPr algn="ctr"/>
+            <a:endParaRPr lang="en-GB" dirty="0"/>
+          </a:p>
+          <a:p>
+            <a:pPr algn="ctr"/>
+            <a:endParaRPr lang="en-GB" dirty="0"/>
+          </a:p>
+          <a:p>
+            <a:pPr algn="ctr"/>
+            <a:endParaRPr lang="en-GB" dirty="0"/>
+          </a:p>
+          <a:p>
+            <a:pPr algn="ctr"/>
+            <a:endParaRPr lang="en-GB" dirty="0"/>
+          </a:p>
+          <a:p>
+            <a:pPr algn="ctr"/>
+            <a:endParaRPr lang="en-GB" dirty="0"/>
+          </a:p>
+          <a:p>
+            <a:pPr algn="ctr"/>
+            <a:endParaRPr lang="en-GB" dirty="0"/>
+          </a:p>
+          <a:p>
+            <a:pPr algn="ctr"/>
+            <a:endParaRPr lang="en-GB" dirty="0"/>
+          </a:p>
+          <a:p>
+            <a:pPr algn="ctr"/>
+            <a:endParaRPr lang="en-GB" dirty="0"/>
+          </a:p>
+          <a:p>
+            <a:pPr algn="ctr"/>
+            <a:endParaRPr lang="en-GB" dirty="0"/>
+          </a:p>
+          <a:p>
+            <a:pPr algn="ctr"/>
+            <a:endParaRPr lang="en-GB" dirty="0"/>
+          </a:p>
+          <a:p>
+            <a:pPr algn="ctr"/>
+            <a:endParaRPr lang="en-GB" dirty="0"/>
+          </a:p>
+          <a:p>
+            <a:pPr algn="ctr"/>
+            <a:endParaRPr lang="en-GB" dirty="0"/>
+          </a:p>
+          <a:p>
+            <a:pPr algn="ctr"/>
+            <a:endParaRPr lang="en-GB" dirty="0"/>
+          </a:p>
+        </p:txBody>
+      </p:sp>
+      <p:sp>
+        <p:nvSpPr>
+          <p:cNvPr id="17" name="Rectangle 16">
+            <a:extLst>
+              <a:ext uri="{FF2B5EF4-FFF2-40B4-BE49-F238E27FC236}">
+                <a16:creationId xmlns:a16="http://schemas.microsoft.com/office/drawing/2014/main" id="{B4A2E2E8-8EC6-2D6C-6B60-4970522104EA}"/>
+              </a:ext>
+              <a:ext uri="{C183D7F6-B498-43B3-948B-1728B52AA6E4}">
+                <adec:decorative xmlns:adec="http://schemas.microsoft.com/office/drawing/2017/decorative" val="1"/>
+              </a:ext>
+            </a:extLst>
+          </p:cNvPr>
+          <p:cNvSpPr>
+            <a:spLocks noGrp="1" noRot="1" noChangeAspect="1" noMove="1" noResize="1" noEditPoints="1" noAdjustHandles="1" noChangeArrowheads="1" noChangeShapeType="1" noTextEdit="1"/>
+          </p:cNvSpPr>
+          <p:nvPr>
+            <p:extLst>
+              <p:ext uri="{386F3935-93C4-4BCD-93E2-E3B085C9AB24}">
+                <p16:designElem xmlns:p16="http://schemas.microsoft.com/office/powerpoint/2015/main" val="1"/>
+              </p:ext>
+            </p:extLst>
+          </p:nvPr>
+        </p:nvSpPr>
+        <p:spPr>
+          <a:xfrm flipH="1">
+            <a:off x="-1" y="-1"/>
+            <a:ext cx="12191998" cy="1590742"/>
+          </a:xfrm>
+          <a:prstGeom prst="rect">
+            <a:avLst/>
+          </a:prstGeom>
+          <a:gradFill>
+            <a:gsLst>
+              <a:gs pos="0">
+                <a:srgbClr val="000000"/>
+              </a:gs>
+              <a:gs pos="100000">
+                <a:schemeClr val="accent1">
+                  <a:lumMod val="75000"/>
+                </a:schemeClr>
+              </a:gs>
+            </a:gsLst>
+            <a:lin ang="8400000" scaled="0"/>
+          </a:gradFill>
+          <a:ln>
+            <a:noFill/>
+          </a:ln>
+        </p:spPr>
+        <p:style>
+          <a:lnRef idx="2">
+            <a:schemeClr val="accent1">
+              <a:shade val="50000"/>
+            </a:schemeClr>
+          </a:lnRef>
+          <a:fillRef idx="1">
+            <a:schemeClr val="accent1"/>
+          </a:fillRef>
+          <a:effectRef idx="0">
+            <a:schemeClr val="accent1"/>
+          </a:effectRef>
+          <a:fontRef idx="minor">
+            <a:schemeClr val="lt1"/>
+          </a:fontRef>
+        </p:style>
+        <p:txBody>
+          <a:bodyPr rtlCol="0" anchor="ctr"/>
+          <a:lstStyle/>
+          <a:p>
+            <a:pPr algn="ctr"/>
+            <a:endParaRPr lang="en-US"/>
+          </a:p>
+        </p:txBody>
+      </p:sp>
+      <p:sp>
+        <p:nvSpPr>
+          <p:cNvPr id="18" name="Rectangle 17">
+            <a:extLst>
+              <a:ext uri="{FF2B5EF4-FFF2-40B4-BE49-F238E27FC236}">
+                <a16:creationId xmlns:a16="http://schemas.microsoft.com/office/drawing/2014/main" id="{910DBC94-8223-6349-9D98-5215D2BAA251}"/>
+              </a:ext>
+              <a:ext uri="{C183D7F6-B498-43B3-948B-1728B52AA6E4}">
+                <adec:decorative xmlns:adec="http://schemas.microsoft.com/office/drawing/2017/decorative" val="1"/>
+              </a:ext>
+            </a:extLst>
+          </p:cNvPr>
+          <p:cNvSpPr>
+            <a:spLocks noGrp="1" noRot="1" noChangeAspect="1" noMove="1" noResize="1" noEditPoints="1" noAdjustHandles="1" noChangeArrowheads="1" noChangeShapeType="1" noTextEdit="1"/>
+          </p:cNvSpPr>
+          <p:nvPr>
+            <p:extLst>
+              <p:ext uri="{386F3935-93C4-4BCD-93E2-E3B085C9AB24}">
+                <p16:designElem xmlns:p16="http://schemas.microsoft.com/office/powerpoint/2015/main" val="1"/>
+              </p:ext>
+            </p:extLst>
+          </p:nvPr>
+        </p:nvSpPr>
+        <p:spPr>
+          <a:xfrm rot="10800000" flipH="1">
+            <a:off x="-3" y="0"/>
+            <a:ext cx="8115306" cy="1590742"/>
+          </a:xfrm>
+          <a:prstGeom prst="rect">
+            <a:avLst/>
+          </a:prstGeom>
+          <a:gradFill>
+            <a:gsLst>
+              <a:gs pos="20000">
+                <a:schemeClr val="accent1">
+                  <a:alpha val="0"/>
+                </a:schemeClr>
+              </a:gs>
+              <a:gs pos="100000">
+                <a:schemeClr val="accent1">
+                  <a:lumMod val="50000"/>
+                  <a:alpha val="55000"/>
+                </a:schemeClr>
+              </a:gs>
+            </a:gsLst>
+            <a:lin ang="13800000" scaled="0"/>
+          </a:gradFill>
+          <a:ln>
+            <a:noFill/>
+          </a:ln>
+        </p:spPr>
+        <p:style>
+          <a:lnRef idx="2">
+            <a:schemeClr val="accent1">
+              <a:shade val="50000"/>
+            </a:schemeClr>
+          </a:lnRef>
+          <a:fillRef idx="1">
+            <a:schemeClr val="accent1"/>
+          </a:fillRef>
+          <a:effectRef idx="0">
+            <a:schemeClr val="accent1"/>
+          </a:effectRef>
+          <a:fontRef idx="minor">
+            <a:schemeClr val="lt1"/>
+          </a:fontRef>
+        </p:style>
+        <p:txBody>
+          <a:bodyPr rtlCol="0" anchor="ctr"/>
+          <a:lstStyle/>
+          <a:p>
+            <a:pPr algn="ctr"/>
+            <a:endParaRPr lang="en-US"/>
+          </a:p>
+        </p:txBody>
+      </p:sp>
+      <p:sp>
+        <p:nvSpPr>
+          <p:cNvPr id="14" name="Rectangle 13">
+            <a:extLst>
+              <a:ext uri="{FF2B5EF4-FFF2-40B4-BE49-F238E27FC236}">
+                <a16:creationId xmlns:a16="http://schemas.microsoft.com/office/drawing/2014/main" id="{C52A0249-2158-368C-3432-0A35124E6940}"/>
+              </a:ext>
+              <a:ext uri="{C183D7F6-B498-43B3-948B-1728B52AA6E4}">
+                <adec:decorative xmlns:adec="http://schemas.microsoft.com/office/drawing/2017/decorative" val="1"/>
+              </a:ext>
+            </a:extLst>
+          </p:cNvPr>
+          <p:cNvSpPr>
+            <a:spLocks noGrp="1" noRot="1" noChangeAspect="1" noMove="1" noResize="1" noEditPoints="1" noAdjustHandles="1" noChangeArrowheads="1" noChangeShapeType="1" noTextEdit="1"/>
+          </p:cNvSpPr>
+          <p:nvPr>
+            <p:extLst>
+              <p:ext uri="{386F3935-93C4-4BCD-93E2-E3B085C9AB24}">
+                <p16:designElem xmlns:p16="http://schemas.microsoft.com/office/powerpoint/2015/main" val="1"/>
+              </p:ext>
+            </p:extLst>
+          </p:nvPr>
+        </p:nvSpPr>
+        <p:spPr>
+          <a:xfrm flipH="1">
+            <a:off x="8115299" y="-1"/>
+            <a:ext cx="4076698" cy="1590742"/>
+          </a:xfrm>
+          <a:prstGeom prst="rect">
+            <a:avLst/>
+          </a:prstGeom>
+          <a:gradFill>
+            <a:gsLst>
+              <a:gs pos="0">
+                <a:schemeClr val="accent1">
+                  <a:alpha val="66000"/>
+                </a:schemeClr>
+              </a:gs>
+              <a:gs pos="100000">
+                <a:srgbClr val="000000">
+                  <a:alpha val="30000"/>
+                </a:srgbClr>
+              </a:gs>
+            </a:gsLst>
+            <a:lin ang="13200000" scaled="0"/>
+          </a:gradFill>
+          <a:ln>
+            <a:noFill/>
+          </a:ln>
+        </p:spPr>
+        <p:style>
+          <a:lnRef idx="2">
+            <a:schemeClr val="accent1">
+              <a:shade val="50000"/>
+            </a:schemeClr>
+          </a:lnRef>
+          <a:fillRef idx="1">
+            <a:schemeClr val="accent1"/>
+          </a:fillRef>
+          <a:effectRef idx="0">
+            <a:schemeClr val="accent1"/>
+          </a:effectRef>
+          <a:fontRef idx="minor">
+            <a:schemeClr val="lt1"/>
+          </a:fontRef>
+        </p:style>
+        <p:txBody>
+          <a:bodyPr rtlCol="0" anchor="ctr"/>
+          <a:lstStyle/>
+          <a:p>
+            <a:pPr algn="ctr"/>
+            <a:endParaRPr lang="en-US"/>
+          </a:p>
+        </p:txBody>
+      </p:sp>
+      <p:sp>
+        <p:nvSpPr>
+          <p:cNvPr id="16" name="Rectangle 15">
+            <a:extLst>
+              <a:ext uri="{FF2B5EF4-FFF2-40B4-BE49-F238E27FC236}">
+                <a16:creationId xmlns:a16="http://schemas.microsoft.com/office/drawing/2014/main" id="{0620185F-B7BD-0200-0F77-11110F2060E7}"/>
+              </a:ext>
+              <a:ext uri="{C183D7F6-B498-43B3-948B-1728B52AA6E4}">
+                <adec:decorative xmlns:adec="http://schemas.microsoft.com/office/drawing/2017/decorative" val="1"/>
+              </a:ext>
+            </a:extLst>
+          </p:cNvPr>
+          <p:cNvSpPr>
+            <a:spLocks noGrp="1" noRot="1" noChangeAspect="1" noMove="1" noResize="1" noEditPoints="1" noAdjustHandles="1" noChangeArrowheads="1" noChangeShapeType="1" noTextEdit="1"/>
+          </p:cNvSpPr>
+          <p:nvPr>
+            <p:extLst>
+              <p:ext uri="{386F3935-93C4-4BCD-93E2-E3B085C9AB24}">
+                <p16:designElem xmlns:p16="http://schemas.microsoft.com/office/powerpoint/2015/main" val="1"/>
+              </p:ext>
+            </p:extLst>
+          </p:nvPr>
+        </p:nvSpPr>
+        <p:spPr>
+          <a:xfrm>
+            <a:off x="459350" y="-1"/>
+            <a:ext cx="11732646" cy="1597433"/>
+          </a:xfrm>
+          <a:prstGeom prst="rect">
+            <a:avLst/>
+          </a:prstGeom>
+          <a:gradFill>
+            <a:gsLst>
+              <a:gs pos="50000">
+                <a:srgbClr val="000000">
+                  <a:alpha val="0"/>
+                </a:srgbClr>
+              </a:gs>
+              <a:gs pos="99000">
+                <a:schemeClr val="accent1">
+                  <a:lumMod val="50000"/>
+                  <a:alpha val="52000"/>
+                </a:schemeClr>
+              </a:gs>
+            </a:gsLst>
+            <a:lin ang="16800000" scaled="0"/>
+          </a:gradFill>
+          <a:ln>
+            <a:noFill/>
+          </a:ln>
+        </p:spPr>
+        <p:style>
+          <a:lnRef idx="2">
+            <a:schemeClr val="accent1">
+              <a:shade val="50000"/>
+            </a:schemeClr>
+          </a:lnRef>
+          <a:fillRef idx="1">
+            <a:schemeClr val="accent1"/>
+          </a:fillRef>
+          <a:effectRef idx="0">
+            <a:schemeClr val="accent1"/>
+          </a:effectRef>
+          <a:fontRef idx="minor">
+            <a:schemeClr val="lt1"/>
+          </a:fontRef>
+        </p:style>
+        <p:txBody>
+          <a:bodyPr rtlCol="0" anchor="ctr"/>
+          <a:lstStyle/>
+          <a:p>
+            <a:pPr algn="ctr"/>
+            <a:endParaRPr lang="en-US"/>
+          </a:p>
+        </p:txBody>
+      </p:sp>
+      <p:sp>
+        <p:nvSpPr>
+          <p:cNvPr id="2" name="Title 1">
+            <a:extLst>
+              <a:ext uri="{FF2B5EF4-FFF2-40B4-BE49-F238E27FC236}">
+                <a16:creationId xmlns:a16="http://schemas.microsoft.com/office/drawing/2014/main" id="{2E94EC8C-CDCE-BB09-116D-A5327FA0B714}"/>
+              </a:ext>
+            </a:extLst>
+          </p:cNvPr>
+          <p:cNvSpPr>
+            <a:spLocks noGrp="1"/>
+          </p:cNvSpPr>
+          <p:nvPr>
+            <p:ph type="title"/>
+          </p:nvPr>
+        </p:nvSpPr>
+        <p:spPr>
+          <a:xfrm>
+            <a:off x="1371599" y="294538"/>
+            <a:ext cx="9895951" cy="1033669"/>
+          </a:xfrm>
+        </p:spPr>
+        <p:txBody>
+          <a:bodyPr>
+            <a:normAutofit/>
+          </a:bodyPr>
+          <a:lstStyle/>
+          <a:p>
+            <a:r>
+              <a:rPr lang="en-GB" sz="4000" dirty="0">
+                <a:solidFill>
+                  <a:srgbClr val="FFFFFF"/>
+                </a:solidFill>
+              </a:rPr>
+              <a:t>Flask Demo 03 : list customer names </a:t>
+            </a:r>
+          </a:p>
+        </p:txBody>
+      </p:sp>
+      <p:graphicFrame>
+        <p:nvGraphicFramePr>
+          <p:cNvPr id="9" name="Diagram 8">
+            <a:extLst>
+              <a:ext uri="{FF2B5EF4-FFF2-40B4-BE49-F238E27FC236}">
+                <a16:creationId xmlns:a16="http://schemas.microsoft.com/office/drawing/2014/main" id="{B1DA629B-B723-C7AB-E0AE-3D5B51C01631}"/>
+              </a:ext>
+            </a:extLst>
+          </p:cNvPr>
+          <p:cNvGraphicFramePr/>
+          <p:nvPr>
+            <p:extLst>
+              <p:ext uri="{D42A27DB-BD31-4B8C-83A1-F6EECF244321}">
+                <p14:modId xmlns:p14="http://schemas.microsoft.com/office/powerpoint/2010/main" val="4257480790"/>
+              </p:ext>
+            </p:extLst>
+          </p:nvPr>
+        </p:nvGraphicFramePr>
+        <p:xfrm>
+          <a:off x="2163046" y="3721343"/>
+          <a:ext cx="6676571" cy="2102514"/>
+        </p:xfrm>
+        <a:graphic>
+          <a:graphicData uri="http://schemas.openxmlformats.org/drawingml/2006/diagram">
+            <dgm:relIds xmlns:dgm="http://schemas.openxmlformats.org/drawingml/2006/diagram" xmlns:r="http://schemas.openxmlformats.org/officeDocument/2006/relationships" r:dm="rId2" r:lo="rId3" r:qs="rId4" r:cs="rId5"/>
+          </a:graphicData>
+        </a:graphic>
+      </p:graphicFrame>
+      <p:sp>
+        <p:nvSpPr>
+          <p:cNvPr id="11" name="Rectangle: Rounded Corners 10">
+            <a:extLst>
+              <a:ext uri="{FF2B5EF4-FFF2-40B4-BE49-F238E27FC236}">
+                <a16:creationId xmlns:a16="http://schemas.microsoft.com/office/drawing/2014/main" id="{0A9A4416-049E-E342-6DF2-02DEFA0815B3}"/>
+              </a:ext>
+            </a:extLst>
+          </p:cNvPr>
+          <p:cNvSpPr/>
+          <p:nvPr/>
+        </p:nvSpPr>
+        <p:spPr>
+          <a:xfrm>
+            <a:off x="1765300" y="2791475"/>
+            <a:ext cx="8128000" cy="736600"/>
+          </a:xfrm>
+          <a:prstGeom prst="roundRect">
+            <a:avLst/>
+          </a:prstGeom>
+        </p:spPr>
+        <p:style>
+          <a:lnRef idx="2">
+            <a:schemeClr val="accent1">
+              <a:shade val="15000"/>
+            </a:schemeClr>
+          </a:lnRef>
+          <a:fillRef idx="1">
+            <a:schemeClr val="accent1"/>
+          </a:fillRef>
+          <a:effectRef idx="0">
+            <a:schemeClr val="accent1"/>
+          </a:effectRef>
+          <a:fontRef idx="minor">
+            <a:schemeClr val="lt1"/>
+          </a:fontRef>
+        </p:style>
+        <p:txBody>
+          <a:bodyPr rtlCol="0" anchor="ctr"/>
+          <a:lstStyle/>
+          <a:p>
+            <a:pPr algn="ctr"/>
+            <a:r>
+              <a:rPr lang="en-GB" sz="3200" b="1" dirty="0"/>
+              <a:t>app.py</a:t>
+            </a:r>
+          </a:p>
+        </p:txBody>
+      </p:sp>
+      <p:cxnSp>
+        <p:nvCxnSpPr>
+          <p:cNvPr id="25" name="Straight Connector 24">
+            <a:extLst>
+              <a:ext uri="{FF2B5EF4-FFF2-40B4-BE49-F238E27FC236}">
+                <a16:creationId xmlns:a16="http://schemas.microsoft.com/office/drawing/2014/main" id="{970CF8CC-8EE9-ECBD-8580-86012AD4A102}"/>
+              </a:ext>
+            </a:extLst>
+          </p:cNvPr>
+          <p:cNvCxnSpPr/>
+          <p:nvPr/>
+        </p:nvCxnSpPr>
+        <p:spPr>
+          <a:xfrm>
+            <a:off x="2522274" y="3858362"/>
+            <a:ext cx="6121400" cy="0"/>
+          </a:xfrm>
+          <a:prstGeom prst="line">
+            <a:avLst/>
+          </a:prstGeom>
+          <a:ln w="28575"/>
+        </p:spPr>
+        <p:style>
+          <a:lnRef idx="2">
+            <a:schemeClr val="accent1"/>
+          </a:lnRef>
+          <a:fillRef idx="0">
+            <a:schemeClr val="accent1"/>
+          </a:fillRef>
+          <a:effectRef idx="1">
+            <a:schemeClr val="accent1"/>
+          </a:effectRef>
+          <a:fontRef idx="minor">
+            <a:schemeClr val="tx1"/>
+          </a:fontRef>
+        </p:style>
+      </p:cxnSp>
+      <p:cxnSp>
+        <p:nvCxnSpPr>
+          <p:cNvPr id="26" name="Straight Connector 25">
+            <a:extLst>
+              <a:ext uri="{FF2B5EF4-FFF2-40B4-BE49-F238E27FC236}">
+                <a16:creationId xmlns:a16="http://schemas.microsoft.com/office/drawing/2014/main" id="{54FF5139-2F7D-49EC-1017-B9FB52AD258C}"/>
+              </a:ext>
+            </a:extLst>
+          </p:cNvPr>
+          <p:cNvCxnSpPr>
+            <a:cxnSpLocks/>
+          </p:cNvCxnSpPr>
+          <p:nvPr/>
+        </p:nvCxnSpPr>
+        <p:spPr>
+          <a:xfrm flipV="1">
+            <a:off x="5702300" y="3528075"/>
+            <a:ext cx="0" cy="304843"/>
+          </a:xfrm>
+          <a:prstGeom prst="line">
+            <a:avLst/>
+          </a:prstGeom>
+          <a:ln w="28575"/>
+        </p:spPr>
+        <p:style>
+          <a:lnRef idx="2">
+            <a:schemeClr val="accent1"/>
+          </a:lnRef>
+          <a:fillRef idx="0">
+            <a:schemeClr val="accent1"/>
+          </a:fillRef>
+          <a:effectRef idx="1">
+            <a:schemeClr val="accent1"/>
+          </a:effectRef>
+          <a:fontRef idx="minor">
+            <a:schemeClr val="tx1"/>
+          </a:fontRef>
+        </p:style>
+      </p:cxnSp>
+      <p:cxnSp>
+        <p:nvCxnSpPr>
+          <p:cNvPr id="31" name="Straight Connector 30">
+            <a:extLst>
+              <a:ext uri="{FF2B5EF4-FFF2-40B4-BE49-F238E27FC236}">
+                <a16:creationId xmlns:a16="http://schemas.microsoft.com/office/drawing/2014/main" id="{FA5A1D61-D16C-48C2-7AA9-9C8C2E424B0B}"/>
+              </a:ext>
+            </a:extLst>
+          </p:cNvPr>
+          <p:cNvCxnSpPr>
+            <a:cxnSpLocks/>
+          </p:cNvCxnSpPr>
+          <p:nvPr/>
+        </p:nvCxnSpPr>
+        <p:spPr>
+          <a:xfrm flipV="1">
+            <a:off x="2522274" y="3858362"/>
+            <a:ext cx="0" cy="304843"/>
+          </a:xfrm>
+          <a:prstGeom prst="line">
+            <a:avLst/>
+          </a:prstGeom>
+          <a:ln w="28575"/>
+        </p:spPr>
+        <p:style>
+          <a:lnRef idx="2">
+            <a:schemeClr val="accent1"/>
+          </a:lnRef>
+          <a:fillRef idx="0">
+            <a:schemeClr val="accent1"/>
+          </a:fillRef>
+          <a:effectRef idx="1">
+            <a:schemeClr val="accent1"/>
+          </a:effectRef>
+          <a:fontRef idx="minor">
+            <a:schemeClr val="tx1"/>
+          </a:fontRef>
+        </p:style>
+      </p:cxnSp>
+      <p:cxnSp>
+        <p:nvCxnSpPr>
+          <p:cNvPr id="32" name="Straight Connector 31">
+            <a:extLst>
+              <a:ext uri="{FF2B5EF4-FFF2-40B4-BE49-F238E27FC236}">
+                <a16:creationId xmlns:a16="http://schemas.microsoft.com/office/drawing/2014/main" id="{75AB8C4A-F9D4-77B2-6E13-231D419F2804}"/>
+              </a:ext>
+            </a:extLst>
+          </p:cNvPr>
+          <p:cNvCxnSpPr>
+            <a:cxnSpLocks/>
+          </p:cNvCxnSpPr>
+          <p:nvPr/>
+        </p:nvCxnSpPr>
+        <p:spPr>
+          <a:xfrm flipV="1">
+            <a:off x="4700815" y="3872238"/>
+            <a:ext cx="0" cy="304843"/>
+          </a:xfrm>
+          <a:prstGeom prst="line">
+            <a:avLst/>
+          </a:prstGeom>
+          <a:ln w="28575"/>
+        </p:spPr>
+        <p:style>
+          <a:lnRef idx="2">
+            <a:schemeClr val="accent1"/>
+          </a:lnRef>
+          <a:fillRef idx="0">
+            <a:schemeClr val="accent1"/>
+          </a:fillRef>
+          <a:effectRef idx="1">
+            <a:schemeClr val="accent1"/>
+          </a:effectRef>
+          <a:fontRef idx="minor">
+            <a:schemeClr val="tx1"/>
+          </a:fontRef>
+        </p:style>
+      </p:cxnSp>
+      <p:cxnSp>
+        <p:nvCxnSpPr>
+          <p:cNvPr id="33" name="Straight Connector 32">
+            <a:extLst>
+              <a:ext uri="{FF2B5EF4-FFF2-40B4-BE49-F238E27FC236}">
+                <a16:creationId xmlns:a16="http://schemas.microsoft.com/office/drawing/2014/main" id="{2A27D6BF-2DDB-38C8-D3C9-01B5DADF861C}"/>
+              </a:ext>
+            </a:extLst>
+          </p:cNvPr>
+          <p:cNvCxnSpPr>
+            <a:cxnSpLocks/>
+          </p:cNvCxnSpPr>
+          <p:nvPr/>
+        </p:nvCxnSpPr>
+        <p:spPr>
+          <a:xfrm flipV="1">
+            <a:off x="8643674" y="3872238"/>
+            <a:ext cx="0" cy="304843"/>
+          </a:xfrm>
+          <a:prstGeom prst="line">
+            <a:avLst/>
+          </a:prstGeom>
+          <a:ln w="28575"/>
+        </p:spPr>
+        <p:style>
+          <a:lnRef idx="2">
+            <a:schemeClr val="accent1"/>
+          </a:lnRef>
+          <a:fillRef idx="0">
+            <a:schemeClr val="accent1"/>
+          </a:fillRef>
+          <a:effectRef idx="1">
+            <a:schemeClr val="accent1"/>
+          </a:effectRef>
+          <a:fontRef idx="minor">
+            <a:schemeClr val="tx1"/>
+          </a:fontRef>
+        </p:style>
+      </p:cxnSp>
+      <p:cxnSp>
+        <p:nvCxnSpPr>
+          <p:cNvPr id="3" name="Straight Connector 2">
+            <a:extLst>
+              <a:ext uri="{FF2B5EF4-FFF2-40B4-BE49-F238E27FC236}">
+                <a16:creationId xmlns:a16="http://schemas.microsoft.com/office/drawing/2014/main" id="{8C630868-00DF-ED19-9528-0728DA34F4E6}"/>
+              </a:ext>
+            </a:extLst>
+          </p:cNvPr>
+          <p:cNvCxnSpPr>
+            <a:cxnSpLocks/>
+          </p:cNvCxnSpPr>
+          <p:nvPr/>
+        </p:nvCxnSpPr>
+        <p:spPr>
+          <a:xfrm flipV="1">
+            <a:off x="6823529" y="3872238"/>
+            <a:ext cx="0" cy="304843"/>
+          </a:xfrm>
+          <a:prstGeom prst="line">
+            <a:avLst/>
+          </a:prstGeom>
+          <a:ln w="28575"/>
+        </p:spPr>
+        <p:style>
+          <a:lnRef idx="2">
+            <a:schemeClr val="accent1"/>
+          </a:lnRef>
+          <a:fillRef idx="0">
+            <a:schemeClr val="accent1"/>
+          </a:fillRef>
+          <a:effectRef idx="1">
+            <a:schemeClr val="accent1"/>
+          </a:effectRef>
+          <a:fontRef idx="minor">
+            <a:schemeClr val="tx1"/>
+          </a:fontRef>
+        </p:style>
+      </p:cxnSp>
+      <p:grpSp>
+        <p:nvGrpSpPr>
+          <p:cNvPr id="4" name="Group 3">
+            <a:extLst>
+              <a:ext uri="{FF2B5EF4-FFF2-40B4-BE49-F238E27FC236}">
+                <a16:creationId xmlns:a16="http://schemas.microsoft.com/office/drawing/2014/main" id="{195A341B-CD97-F356-154A-AC0E343BE68C}"/>
+              </a:ext>
+            </a:extLst>
+          </p:cNvPr>
+          <p:cNvGrpSpPr/>
+          <p:nvPr/>
+        </p:nvGrpSpPr>
+        <p:grpSpPr>
+          <a:xfrm>
+            <a:off x="5605077" y="6017125"/>
+            <a:ext cx="1509400" cy="489600"/>
+            <a:chOff x="1723226" y="433136"/>
+            <a:chExt cx="1509400" cy="489600"/>
+          </a:xfrm>
+        </p:grpSpPr>
+        <p:sp>
+          <p:nvSpPr>
+            <p:cNvPr id="6" name="Rectangle 5">
+              <a:extLst>
+                <a:ext uri="{FF2B5EF4-FFF2-40B4-BE49-F238E27FC236}">
+                  <a16:creationId xmlns:a16="http://schemas.microsoft.com/office/drawing/2014/main" id="{6B610971-8E0E-910D-A794-66C3E6622C1D}"/>
+                </a:ext>
+              </a:extLst>
+            </p:cNvPr>
+            <p:cNvSpPr/>
+            <p:nvPr/>
+          </p:nvSpPr>
+          <p:spPr>
+            <a:xfrm>
+              <a:off x="1723226" y="433136"/>
+              <a:ext cx="1509400" cy="489600"/>
+            </a:xfrm>
+            <a:prstGeom prst="rect">
+              <a:avLst/>
+            </a:prstGeom>
+          </p:spPr>
+          <p:style>
+            <a:lnRef idx="1">
+              <a:schemeClr val="accent6"/>
+            </a:lnRef>
+            <a:fillRef idx="2">
+              <a:schemeClr val="accent6"/>
+            </a:fillRef>
+            <a:effectRef idx="1">
+              <a:schemeClr val="accent6"/>
+            </a:effectRef>
+            <a:fontRef idx="minor">
+              <a:schemeClr val="dk1"/>
+            </a:fontRef>
+          </p:style>
+          <p:txBody>
+            <a:bodyPr/>
+            <a:lstStyle/>
+            <a:p>
+              <a:endParaRPr lang="en-GB"/>
+            </a:p>
+          </p:txBody>
+        </p:sp>
+        <p:sp>
+          <p:nvSpPr>
+            <p:cNvPr id="7" name="TextBox 6">
+              <a:extLst>
+                <a:ext uri="{FF2B5EF4-FFF2-40B4-BE49-F238E27FC236}">
+                  <a16:creationId xmlns:a16="http://schemas.microsoft.com/office/drawing/2014/main" id="{941FABA1-95C6-2C24-1DBC-84F8D3784B5A}"/>
+                </a:ext>
+              </a:extLst>
+            </p:cNvPr>
+            <p:cNvSpPr txBox="1"/>
+            <p:nvPr/>
+          </p:nvSpPr>
+          <p:spPr>
+            <a:xfrm>
+              <a:off x="1723226" y="433136"/>
+              <a:ext cx="1509400" cy="489600"/>
+            </a:xfrm>
+            <a:prstGeom prst="rect">
+              <a:avLst/>
+            </a:prstGeom>
+          </p:spPr>
+          <p:style>
+            <a:lnRef idx="1">
+              <a:schemeClr val="accent6"/>
+            </a:lnRef>
+            <a:fillRef idx="2">
+              <a:schemeClr val="accent6"/>
+            </a:fillRef>
+            <a:effectRef idx="1">
+              <a:schemeClr val="accent6"/>
+            </a:effectRef>
+            <a:fontRef idx="minor">
+              <a:schemeClr val="dk1"/>
+            </a:fontRef>
+          </p:style>
+          <p:txBody>
+            <a:bodyPr spcFirstLastPara="0" vert="horz" wrap="square" lIns="120904" tIns="69088" rIns="120904" bIns="69088" numCol="1" spcCol="1270" anchor="ctr" anchorCtr="0">
+              <a:noAutofit/>
+            </a:bodyPr>
+            <a:lstStyle/>
+            <a:p>
+              <a:pPr marL="0" lvl="0" indent="0" algn="ctr" defTabSz="755650">
+                <a:lnSpc>
+                  <a:spcPct val="90000"/>
+                </a:lnSpc>
+                <a:spcBef>
+                  <a:spcPct val="0"/>
+                </a:spcBef>
+                <a:spcAft>
+                  <a:spcPct val="35000"/>
+                </a:spcAft>
+                <a:buNone/>
+              </a:pPr>
+              <a:r>
+                <a:rPr lang="en-GB" sz="1700" kern="1200" dirty="0"/>
+                <a:t>Custqry.html</a:t>
+              </a:r>
+            </a:p>
+          </p:txBody>
+        </p:sp>
+      </p:grpSp>
+      <p:sp>
+        <p:nvSpPr>
+          <p:cNvPr id="8" name="Rectangle: Rounded Corners 7">
+            <a:extLst>
+              <a:ext uri="{FF2B5EF4-FFF2-40B4-BE49-F238E27FC236}">
+                <a16:creationId xmlns:a16="http://schemas.microsoft.com/office/drawing/2014/main" id="{E0D7672A-E5A7-A453-420D-BBC336CD7BBF}"/>
+              </a:ext>
+            </a:extLst>
+          </p:cNvPr>
+          <p:cNvSpPr/>
+          <p:nvPr/>
+        </p:nvSpPr>
+        <p:spPr>
+          <a:xfrm>
+            <a:off x="3212195" y="5580572"/>
+            <a:ext cx="2177142" cy="436553"/>
+          </a:xfrm>
+          <a:prstGeom prst="roundRect">
+            <a:avLst/>
+          </a:prstGeom>
+        </p:spPr>
+        <p:style>
+          <a:lnRef idx="2">
+            <a:schemeClr val="accent6">
+              <a:shade val="15000"/>
+            </a:schemeClr>
+          </a:lnRef>
+          <a:fillRef idx="1">
+            <a:schemeClr val="accent6"/>
+          </a:fillRef>
+          <a:effectRef idx="0">
+            <a:schemeClr val="accent6"/>
+          </a:effectRef>
+          <a:fontRef idx="minor">
+            <a:schemeClr val="lt1"/>
+          </a:fontRef>
+        </p:style>
+        <p:txBody>
+          <a:bodyPr rtlCol="0" anchor="ctr"/>
+          <a:lstStyle/>
+          <a:p>
+            <a:pPr algn="ctr"/>
+            <a:r>
+              <a:rPr lang="en-GB" sz="2000" b="1" dirty="0"/>
+              <a:t>getCustData.py</a:t>
+            </a:r>
+          </a:p>
+        </p:txBody>
+      </p:sp>
+      <p:cxnSp>
+        <p:nvCxnSpPr>
+          <p:cNvPr id="10" name="Straight Connector 9">
+            <a:extLst>
+              <a:ext uri="{FF2B5EF4-FFF2-40B4-BE49-F238E27FC236}">
+                <a16:creationId xmlns:a16="http://schemas.microsoft.com/office/drawing/2014/main" id="{8B05BC2F-0870-CDE0-988E-2EB197BC7B61}"/>
+              </a:ext>
+            </a:extLst>
+          </p:cNvPr>
+          <p:cNvCxnSpPr>
+            <a:cxnSpLocks/>
+            <a:stCxn id="8" idx="0"/>
+          </p:cNvCxnSpPr>
+          <p:nvPr/>
+        </p:nvCxnSpPr>
+        <p:spPr>
+          <a:xfrm flipV="1">
+            <a:off x="4300766" y="5246914"/>
+            <a:ext cx="0" cy="333658"/>
+          </a:xfrm>
+          <a:prstGeom prst="line">
+            <a:avLst/>
+          </a:prstGeom>
+          <a:ln w="28575"/>
+        </p:spPr>
+        <p:style>
+          <a:lnRef idx="2">
+            <a:schemeClr val="accent1"/>
+          </a:lnRef>
+          <a:fillRef idx="0">
+            <a:schemeClr val="accent1"/>
+          </a:fillRef>
+          <a:effectRef idx="1">
+            <a:schemeClr val="accent1"/>
+          </a:effectRef>
+          <a:fontRef idx="minor">
+            <a:schemeClr val="tx1"/>
+          </a:fontRef>
+        </p:style>
+      </p:cxnSp>
+      <p:cxnSp>
+        <p:nvCxnSpPr>
+          <p:cNvPr id="34" name="Connector: Elbow 33">
+            <a:extLst>
+              <a:ext uri="{FF2B5EF4-FFF2-40B4-BE49-F238E27FC236}">
+                <a16:creationId xmlns:a16="http://schemas.microsoft.com/office/drawing/2014/main" id="{C946C292-FB12-B308-92A5-4F17BFCA2824}"/>
+              </a:ext>
+            </a:extLst>
+          </p:cNvPr>
+          <p:cNvCxnSpPr>
+            <a:stCxn id="8" idx="2"/>
+            <a:endCxn id="7" idx="1"/>
+          </p:cNvCxnSpPr>
+          <p:nvPr/>
+        </p:nvCxnSpPr>
+        <p:spPr>
+          <a:xfrm rot="16200000" flipH="1">
+            <a:off x="4830521" y="5487369"/>
+            <a:ext cx="244800" cy="1304311"/>
+          </a:xfrm>
+          <a:prstGeom prst="bentConnector2">
+            <a:avLst/>
+          </a:prstGeom>
+          <a:ln w="28575">
+            <a:tailEnd type="triangle"/>
+          </a:ln>
+        </p:spPr>
+        <p:style>
+          <a:lnRef idx="2">
+            <a:schemeClr val="accent1"/>
+          </a:lnRef>
+          <a:fillRef idx="0">
+            <a:schemeClr val="accent1"/>
+          </a:fillRef>
+          <a:effectRef idx="1">
+            <a:schemeClr val="accent1"/>
+          </a:effectRef>
+          <a:fontRef idx="minor">
+            <a:schemeClr val="tx1"/>
+          </a:fontRef>
+        </p:style>
+      </p:cxnSp>
     </p:spTree>
     <p:extLst>
       <p:ext uri="{BB962C8B-B14F-4D97-AF65-F5344CB8AC3E}">
-        <p14:creationId xmlns:p14="http://schemas.microsoft.com/office/powerpoint/2010/main" val="2187728525"/>
+        <p14:creationId xmlns:p14="http://schemas.microsoft.com/office/powerpoint/2010/main" val="3888390821"/>
       </p:ext>
     </p:extLst>
   </p:cSld>

</xml_diff>